<commit_message>
add word embedding section (wip)
</commit_message>
<xml_diff>
--- a/docs/introduction.pptx
+++ b/docs/introduction.pptx
@@ -7,10 +7,10 @@
     <p:sldMasterId id="2147483688" r:id="rId3"/>
   </p:sldMasterIdLst>
   <p:notesMasterIdLst>
-    <p:notesMasterId r:id="rId42"/>
+    <p:notesMasterId r:id="rId43"/>
   </p:notesMasterIdLst>
   <p:handoutMasterIdLst>
-    <p:handoutMasterId r:id="rId43"/>
+    <p:handoutMasterId r:id="rId44"/>
   </p:handoutMasterIdLst>
   <p:sldIdLst>
     <p:sldId id="256" r:id="rId4"/>
@@ -50,7 +50,8 @@
     <p:sldId id="370" r:id="rId38"/>
     <p:sldId id="337" r:id="rId39"/>
     <p:sldId id="380" r:id="rId40"/>
-    <p:sldId id="379" r:id="rId41"/>
+    <p:sldId id="381" r:id="rId41"/>
+    <p:sldId id="379" r:id="rId42"/>
   </p:sldIdLst>
   <p:sldSz cx="9144000" cy="6858000" type="screen4x3"/>
   <p:notesSz cx="6797675" cy="9926638"/>
@@ -254,7 +255,7 @@
           <a:p>
             <a:fld id="{E74CFDE5-F6E3-4919-ABF4-5791A8FD4258}" type="datetimeFigureOut">
               <a:rPr lang="de-DE" smtClean="0"/>
-              <a:t>21.09.2018</a:t>
+              <a:t>23.09.2018</a:t>
             </a:fld>
             <a:endParaRPr lang="de-DE"/>
           </a:p>
@@ -4899,7 +4900,7 @@
           <a:p>
             <a:fld id="{4FCF2C78-904C-43E1-B76A-8913AB71092D}" type="datetimeFigureOut">
               <a:rPr lang="de-DE" smtClean="0"/>
-              <a:t>21.09.2018</a:t>
+              <a:t>23.09.2018</a:t>
             </a:fld>
             <a:endParaRPr lang="de-DE"/>
           </a:p>
@@ -5205,7 +5206,7 @@
           <a:p>
             <a:fld id="{4FCF2C78-904C-43E1-B76A-8913AB71092D}" type="datetimeFigureOut">
               <a:rPr lang="de-DE" smtClean="0"/>
-              <a:t>21.09.2018</a:t>
+              <a:t>23.09.2018</a:t>
             </a:fld>
             <a:endParaRPr lang="de-DE"/>
           </a:p>
@@ -5511,7 +5512,7 @@
           <a:p>
             <a:fld id="{4FCF2C78-904C-43E1-B76A-8913AB71092D}" type="datetimeFigureOut">
               <a:rPr lang="de-DE" smtClean="0"/>
-              <a:t>21.09.2018</a:t>
+              <a:t>23.09.2018</a:t>
             </a:fld>
             <a:endParaRPr lang="de-DE"/>
           </a:p>
@@ -6064,7 +6065,7 @@
           <a:p>
             <a:fld id="{4FCF2C78-904C-43E1-B76A-8913AB71092D}" type="datetimeFigureOut">
               <a:rPr lang="de-DE" smtClean="0"/>
-              <a:t>21.09.2018</a:t>
+              <a:t>23.09.2018</a:t>
             </a:fld>
             <a:endParaRPr lang="de-DE"/>
           </a:p>
@@ -6238,7 +6239,7 @@
           <a:p>
             <a:fld id="{4FCF2C78-904C-43E1-B76A-8913AB71092D}" type="datetimeFigureOut">
               <a:rPr lang="de-DE" smtClean="0"/>
-              <a:t>21.09.2018</a:t>
+              <a:t>23.09.2018</a:t>
             </a:fld>
             <a:endParaRPr lang="de-DE"/>
           </a:p>
@@ -6375,7 +6376,7 @@
           <a:p>
             <a:fld id="{4FCF2C78-904C-43E1-B76A-8913AB71092D}" type="datetimeFigureOut">
               <a:rPr lang="de-DE" smtClean="0"/>
-              <a:t>21.09.2018</a:t>
+              <a:t>23.09.2018</a:t>
             </a:fld>
             <a:endParaRPr lang="de-DE"/>
           </a:p>
@@ -6721,7 +6722,7 @@
           <a:p>
             <a:fld id="{4FCF2C78-904C-43E1-B76A-8913AB71092D}" type="datetimeFigureOut">
               <a:rPr lang="de-DE" smtClean="0"/>
-              <a:t>21.09.2018</a:t>
+              <a:t>23.09.2018</a:t>
             </a:fld>
             <a:endParaRPr lang="de-DE"/>
           </a:p>
@@ -7043,7 +7044,7 @@
           <a:p>
             <a:fld id="{4FCF2C78-904C-43E1-B76A-8913AB71092D}" type="datetimeFigureOut">
               <a:rPr lang="de-DE" smtClean="0"/>
-              <a:t>21.09.2018</a:t>
+              <a:t>23.09.2018</a:t>
             </a:fld>
             <a:endParaRPr lang="de-DE"/>
           </a:p>
@@ -7283,7 +7284,7 @@
           <a:p>
             <a:fld id="{4FCF2C78-904C-43E1-B76A-8913AB71092D}" type="datetimeFigureOut">
               <a:rPr lang="de-DE" smtClean="0"/>
-              <a:t>21.09.2018</a:t>
+              <a:t>23.09.2018</a:t>
             </a:fld>
             <a:endParaRPr lang="de-DE"/>
           </a:p>
@@ -7523,7 +7524,7 @@
           <a:p>
             <a:fld id="{4FCF2C78-904C-43E1-B76A-8913AB71092D}" type="datetimeFigureOut">
               <a:rPr lang="de-DE" smtClean="0"/>
-              <a:t>21.09.2018</a:t>
+              <a:t>23.09.2018</a:t>
             </a:fld>
             <a:endParaRPr lang="de-DE"/>
           </a:p>
@@ -13163,7 +13164,7 @@
               <a:buChar char="&gt;"/>
             </a:pPr>
             <a:r>
-              <a:rPr lang="en-US" sz="2400" spc="-1" dirty="0">
+              <a:rPr lang="en-US" sz="2400" b="1" spc="-1" dirty="0">
                 <a:solidFill>
                   <a:srgbClr val="000000"/>
                 </a:solidFill>
@@ -22739,6 +22740,22 @@
             </a:r>
             <a:r>
               <a:rPr lang="de-DE" sz="1800" dirty="0"/>
+              <a:t> </a:t>
+            </a:r>
+            <a:r>
+              <a:rPr lang="de-DE" sz="1800" dirty="0" err="1"/>
+              <a:t>or</a:t>
+            </a:r>
+            <a:r>
+              <a:rPr lang="de-DE" sz="1800" dirty="0"/>
+              <a:t> </a:t>
+            </a:r>
+            <a:r>
+              <a:rPr lang="de-DE" sz="1800" dirty="0" err="1"/>
+              <a:t>matrices</a:t>
+            </a:r>
+            <a:r>
+              <a:rPr lang="de-DE" sz="1800" dirty="0"/>
               <a:t>  </a:t>
             </a:r>
           </a:p>
@@ -24359,7 +24376,7 @@
                 </a:uFill>
                 <a:latin typeface="Arial"/>
               </a:rPr>
-              <a:t>Organisation</a:t>
+              <a:t>Tools and Frameworks</a:t>
             </a:r>
             <a:endParaRPr lang="de-DE" sz="3200" b="0" strike="noStrike" spc="-1" dirty="0">
               <a:solidFill>
@@ -24804,7 +24821,7 @@
               </a:lnSpc>
             </a:pPr>
             <a:r>
-              <a:rPr lang="de-DE" sz="2400" b="1" spc="-1" dirty="0" err="1">
+              <a:rPr lang="de-DE" sz="2400" b="1" spc="-1" dirty="0">
                 <a:solidFill>
                   <a:srgbClr val="4F81BD"/>
                 </a:solidFill>
@@ -24815,7 +24832,7 @@
                 </a:uFill>
                 <a:latin typeface="Arial"/>
               </a:rPr>
-              <a:t>Prerequisites</a:t>
+              <a:t>General</a:t>
             </a:r>
             <a:endParaRPr lang="de-DE" sz="3200" b="0" strike="noStrike" spc="-1" dirty="0">
               <a:solidFill>
@@ -24831,6 +24848,227 @@
           </a:p>
         </p:txBody>
       </p:sp>
+      <p:sp>
+        <p:nvSpPr>
+          <p:cNvPr id="193" name="TextShape 2"/>
+          <p:cNvSpPr txBox="1"/>
+          <p:nvPr/>
+        </p:nvSpPr>
+        <p:spPr>
+          <a:xfrm>
+            <a:off x="468360" y="242280"/>
+            <a:ext cx="5882760" cy="713880"/>
+          </a:xfrm>
+          <a:prstGeom prst="rect">
+            <a:avLst/>
+          </a:prstGeom>
+          <a:noFill/>
+          <a:ln>
+            <a:noFill/>
+          </a:ln>
+        </p:spPr>
+        <p:txBody>
+          <a:bodyPr lIns="0" tIns="0" rIns="0" bIns="0" anchor="b"/>
+          <a:lstStyle/>
+          <a:p>
+            <a:pPr>
+              <a:lnSpc>
+                <a:spcPct val="100000"/>
+              </a:lnSpc>
+            </a:pPr>
+            <a:r>
+              <a:rPr lang="de-DE" sz="2400" b="1" strike="noStrike" spc="-1" dirty="0">
+                <a:solidFill>
+                  <a:srgbClr val="000000"/>
+                </a:solidFill>
+                <a:uFill>
+                  <a:solidFill>
+                    <a:srgbClr val="FFFFFF"/>
+                  </a:solidFill>
+                </a:uFill>
+                <a:latin typeface="Arial"/>
+              </a:rPr>
+              <a:t>Classification </a:t>
+            </a:r>
+            <a:r>
+              <a:rPr lang="de-DE" sz="2400" b="1" strike="noStrike" spc="-1" dirty="0" err="1">
+                <a:solidFill>
+                  <a:srgbClr val="000000"/>
+                </a:solidFill>
+                <a:uFill>
+                  <a:solidFill>
+                    <a:srgbClr val="FFFFFF"/>
+                  </a:solidFill>
+                </a:uFill>
+                <a:latin typeface="Arial"/>
+              </a:rPr>
+              <a:t>with</a:t>
+            </a:r>
+            <a:r>
+              <a:rPr lang="de-DE" sz="2400" b="1" strike="noStrike" spc="-1" dirty="0">
+                <a:solidFill>
+                  <a:srgbClr val="000000"/>
+                </a:solidFill>
+                <a:uFill>
+                  <a:solidFill>
+                    <a:srgbClr val="FFFFFF"/>
+                  </a:solidFill>
+                </a:uFill>
+                <a:latin typeface="Arial"/>
+              </a:rPr>
+              <a:t> </a:t>
+            </a:r>
+            <a:r>
+              <a:rPr lang="de-DE" sz="2400" b="1" strike="noStrike" spc="-1" dirty="0" err="1">
+                <a:solidFill>
+                  <a:srgbClr val="000000"/>
+                </a:solidFill>
+                <a:uFill>
+                  <a:solidFill>
+                    <a:srgbClr val="FFFFFF"/>
+                  </a:solidFill>
+                </a:uFill>
+                <a:latin typeface="Arial"/>
+              </a:rPr>
+              <a:t>Neural</a:t>
+            </a:r>
+            <a:r>
+              <a:rPr lang="de-DE" sz="2400" b="1" strike="noStrike" spc="-1" dirty="0">
+                <a:solidFill>
+                  <a:srgbClr val="000000"/>
+                </a:solidFill>
+                <a:uFill>
+                  <a:solidFill>
+                    <a:srgbClr val="FFFFFF"/>
+                  </a:solidFill>
+                </a:uFill>
+                <a:latin typeface="Arial"/>
+              </a:rPr>
+              <a:t> Networks </a:t>
+            </a:r>
+            <a:endParaRPr lang="de-DE" sz="3200" b="0" strike="noStrike" spc="-1" dirty="0">
+              <a:solidFill>
+                <a:srgbClr val="000000"/>
+              </a:solidFill>
+              <a:uFill>
+                <a:solidFill>
+                  <a:srgbClr val="FFFFFF"/>
+                </a:solidFill>
+              </a:uFill>
+              <a:latin typeface="Arial"/>
+            </a:endParaRPr>
+          </a:p>
+        </p:txBody>
+      </p:sp>
+      <p:sp>
+        <p:nvSpPr>
+          <p:cNvPr id="5" name="TextShape 3">
+            <a:extLst>
+              <a:ext uri="{FF2B5EF4-FFF2-40B4-BE49-F238E27FC236}">
+                <a16:creationId xmlns:a16="http://schemas.microsoft.com/office/drawing/2014/main" id="{B87C0B4A-A352-4A40-AE98-79D6D03AC4F3}"/>
+              </a:ext>
+            </a:extLst>
+          </p:cNvPr>
+          <p:cNvSpPr txBox="1"/>
+          <p:nvPr/>
+        </p:nvSpPr>
+        <p:spPr>
+          <a:xfrm>
+            <a:off x="468360" y="1989000"/>
+            <a:ext cx="8206920" cy="4247640"/>
+          </a:xfrm>
+          <a:prstGeom prst="rect">
+            <a:avLst/>
+          </a:prstGeom>
+          <a:noFill/>
+          <a:ln>
+            <a:noFill/>
+          </a:ln>
+        </p:spPr>
+        <p:txBody>
+          <a:bodyPr lIns="0" tIns="0" rIns="0" bIns="0"/>
+          <a:lstStyle/>
+          <a:p>
+            <a:pPr marL="343080" indent="-342720">
+              <a:lnSpc>
+                <a:spcPct val="150000"/>
+              </a:lnSpc>
+              <a:buClr>
+                <a:srgbClr val="8064A2"/>
+              </a:buClr>
+              <a:buFont typeface="Arial"/>
+              <a:buChar char="&gt;"/>
+            </a:pPr>
+            <a:endParaRPr lang="en-US" sz="2400" spc="-1" dirty="0">
+              <a:solidFill>
+                <a:srgbClr val="000000"/>
+              </a:solidFill>
+              <a:uFill>
+                <a:solidFill>
+                  <a:srgbClr val="FFFFFF"/>
+                </a:solidFill>
+              </a:uFill>
+            </a:endParaRPr>
+          </a:p>
+        </p:txBody>
+      </p:sp>
+    </p:spTree>
+    <p:extLst>
+      <p:ext uri="{BB962C8B-B14F-4D97-AF65-F5344CB8AC3E}">
+        <p14:creationId xmlns:p14="http://schemas.microsoft.com/office/powerpoint/2010/main" val="2460437092"/>
+      </p:ext>
+    </p:extLst>
+  </p:cSld>
+  <p:clrMapOvr>
+    <a:masterClrMapping/>
+  </p:clrMapOvr>
+  <p:timing>
+    <p:tnLst>
+      <p:par>
+        <p:cTn id="1" dur="indefinite" restart="never" nodeType="tmRoot">
+          <p:childTnLst>
+            <p:seq>
+              <p:cTn id="2" nodeType="mainSeq"/>
+              <p:prevCondLst>
+                <p:cond evt="onPrev" delay="0">
+                  <p:tgtEl>
+                    <p:sldTgt/>
+                  </p:tgtEl>
+                </p:cond>
+              </p:prevCondLst>
+              <p:nextCondLst>
+                <p:cond evt="onNext" delay="0">
+                  <p:tgtEl>
+                    <p:sldTgt/>
+                  </p:tgtEl>
+                </p:cond>
+              </p:nextCondLst>
+            </p:seq>
+          </p:childTnLst>
+        </p:cTn>
+      </p:par>
+    </p:tnLst>
+  </p:timing>
+</p:sld>
+</file>
+
+<file path=ppt/slides/slide39.xml><?xml version="1.0" encoding="utf-8"?>
+<p:sld xmlns:a="http://schemas.openxmlformats.org/drawingml/2006/main" xmlns:r="http://schemas.openxmlformats.org/officeDocument/2006/relationships" xmlns:p="http://schemas.openxmlformats.org/presentationml/2006/main">
+  <p:cSld>
+    <p:spTree>
+      <p:nvGrpSpPr>
+        <p:cNvPr id="1" name=""/>
+        <p:cNvGrpSpPr/>
+        <p:nvPr/>
+      </p:nvGrpSpPr>
+      <p:grpSpPr>
+        <a:xfrm>
+          <a:off x="0" y="0"/>
+          <a:ext cx="0" cy="0"/>
+          <a:chOff x="0" y="0"/>
+          <a:chExt cx="0" cy="0"/>
+        </a:xfrm>
+      </p:grpSpPr>
       <p:sp>
         <p:nvSpPr>
           <p:cNvPr id="193" name="TextShape 2"/>

</xml_diff>

<commit_message>
Word embedding section done (added some gifs)
</commit_message>
<xml_diff>
--- a/docs/introduction.pptx
+++ b/docs/introduction.pptx
@@ -7,10 +7,10 @@
     <p:sldMasterId id="2147483688" r:id="rId3"/>
   </p:sldMasterIdLst>
   <p:notesMasterIdLst>
-    <p:notesMasterId r:id="rId43"/>
+    <p:notesMasterId r:id="rId44"/>
   </p:notesMasterIdLst>
   <p:handoutMasterIdLst>
-    <p:handoutMasterId r:id="rId44"/>
+    <p:handoutMasterId r:id="rId45"/>
   </p:handoutMasterIdLst>
   <p:sldIdLst>
     <p:sldId id="256" r:id="rId4"/>
@@ -28,7 +28,7 @@
     <p:sldId id="373" r:id="rId16"/>
     <p:sldId id="375" r:id="rId17"/>
     <p:sldId id="377" r:id="rId18"/>
-    <p:sldId id="378" r:id="rId19"/>
+    <p:sldId id="382" r:id="rId19"/>
     <p:sldId id="340" r:id="rId20"/>
     <p:sldId id="339" r:id="rId21"/>
     <p:sldId id="349" r:id="rId22"/>
@@ -45,13 +45,14 @@
     <p:sldId id="364" r:id="rId33"/>
     <p:sldId id="365" r:id="rId34"/>
     <p:sldId id="360" r:id="rId35"/>
-    <p:sldId id="362" r:id="rId36"/>
-    <p:sldId id="348" r:id="rId37"/>
+    <p:sldId id="348" r:id="rId36"/>
+    <p:sldId id="362" r:id="rId37"/>
     <p:sldId id="370" r:id="rId38"/>
     <p:sldId id="337" r:id="rId39"/>
     <p:sldId id="380" r:id="rId40"/>
     <p:sldId id="381" r:id="rId41"/>
-    <p:sldId id="379" r:id="rId42"/>
+    <p:sldId id="383" r:id="rId42"/>
+    <p:sldId id="379" r:id="rId43"/>
   </p:sldIdLst>
   <p:sldSz cx="9144000" cy="6858000" type="screen4x3"/>
   <p:notesSz cx="6797675" cy="9926638"/>
@@ -1186,7 +1187,7 @@
             <a:fld id="{8ACBFEC4-EF09-4521-B71D-F1133CDF555A}" type="slidenum">
               <a:rPr lang="de-DE" smtClean="0"/>
               <a:pPr/>
-              <a:t>33</a:t>
+              <a:t>34</a:t>
             </a:fld>
             <a:endParaRPr lang="de-DE"/>
           </a:p>
@@ -12698,16 +12699,19 @@
               </a:rPr>
               <a:t>https://www.gutenberg.org/</a:t>
             </a:r>
-            <a:endParaRPr lang="en-US" sz="2400" spc="-1" dirty="0">
-              <a:solidFill>
-                <a:srgbClr val="000000"/>
-              </a:solidFill>
-              <a:uFill>
-                <a:solidFill>
-                  <a:srgbClr val="FFFFFF"/>
-                </a:solidFill>
-              </a:uFill>
-            </a:endParaRPr>
+            <a:r>
+              <a:rPr lang="en-US" sz="2400" spc="-1" dirty="0">
+                <a:solidFill>
+                  <a:srgbClr val="000000"/>
+                </a:solidFill>
+                <a:uFill>
+                  <a:solidFill>
+                    <a:srgbClr val="FFFFFF"/>
+                  </a:solidFill>
+                </a:uFill>
+              </a:rPr>
+              <a:t> (for text)</a:t>
+            </a:r>
           </a:p>
           <a:p>
             <a:pPr marL="343080" indent="-342720">
@@ -12721,7 +12725,7 @@
               <a:buChar char="&gt;"/>
             </a:pPr>
             <a:r>
-              <a:rPr lang="en-US" sz="2400" spc="-1">
+              <a:rPr lang="en-US" sz="2400" spc="-1" dirty="0">
                 <a:solidFill>
                   <a:srgbClr val="000000"/>
                 </a:solidFill>
@@ -12731,7 +12735,20 @@
                   </a:solidFill>
                 </a:uFill>
               </a:rPr>
-              <a:t>(Todo</a:t>
+              <a:t>(</a:t>
+            </a:r>
+            <a:r>
+              <a:rPr lang="en-US" sz="2400" spc="-1" dirty="0" err="1">
+                <a:solidFill>
+                  <a:srgbClr val="000000"/>
+                </a:solidFill>
+                <a:uFill>
+                  <a:solidFill>
+                    <a:srgbClr val="FFFFFF"/>
+                  </a:solidFill>
+                </a:uFill>
+              </a:rPr>
+              <a:t>Todo</a:t>
             </a:r>
             <a:r>
               <a:rPr lang="en-US" sz="2400" spc="-1" dirty="0">
@@ -14246,7 +14263,7 @@
                   </a:solidFill>
                 </a:uFill>
               </a:rPr>
-              <a:t>Unstructured data (e.g. Natural Language)</a:t>
+              <a:t>Unstructured data (e.g. CSV files)</a:t>
             </a:r>
           </a:p>
           <a:p>
@@ -14272,6 +14289,31 @@
                 </a:uFill>
               </a:rPr>
               <a:t>Machine generated (e.g. server log files)</a:t>
+            </a:r>
+          </a:p>
+          <a:p>
+            <a:pPr marL="343080" indent="-342720">
+              <a:lnSpc>
+                <a:spcPct val="150000"/>
+              </a:lnSpc>
+              <a:buClr>
+                <a:srgbClr val="8064A2"/>
+              </a:buClr>
+              <a:buFont typeface="Arial"/>
+              <a:buChar char="&gt;"/>
+            </a:pPr>
+            <a:r>
+              <a:rPr lang="en-US" sz="2400" spc="-1" dirty="0">
+                <a:solidFill>
+                  <a:srgbClr val="000000"/>
+                </a:solidFill>
+                <a:uFill>
+                  <a:solidFill>
+                    <a:srgbClr val="FFFFFF"/>
+                  </a:solidFill>
+                </a:uFill>
+              </a:rPr>
+              <a:t>Natural Language</a:t>
             </a:r>
           </a:p>
           <a:p>
@@ -14478,7 +14520,7 @@
               </a:lnSpc>
             </a:pPr>
             <a:r>
-              <a:rPr lang="de-DE" sz="2400" b="1" strike="noStrike" spc="-1" dirty="0">
+              <a:rPr lang="de-DE" sz="2400" b="1" strike="noStrike" spc="-1" dirty="0" err="1">
                 <a:solidFill>
                   <a:srgbClr val="4F81BD"/>
                 </a:solidFill>
@@ -14489,10 +14531,10 @@
                 </a:uFill>
                 <a:latin typeface="Arial"/>
               </a:rPr>
-              <a:t>Focus </a:t>
-            </a:r>
-            <a:r>
-              <a:rPr lang="de-DE" sz="2400" b="1" strike="noStrike" spc="-1" dirty="0" err="1">
+              <a:t>Types</a:t>
+            </a:r>
+            <a:r>
+              <a:rPr lang="de-DE" sz="2400" b="1" strike="noStrike" spc="-1" dirty="0">
                 <a:solidFill>
                   <a:srgbClr val="4F81BD"/>
                 </a:solidFill>
@@ -14503,10 +14545,10 @@
                 </a:uFill>
                 <a:latin typeface="Arial"/>
               </a:rPr>
-              <a:t>of</a:t>
-            </a:r>
-            <a:r>
-              <a:rPr lang="de-DE" sz="2400" b="1" strike="noStrike" spc="-1" dirty="0">
+              <a:t> </a:t>
+            </a:r>
+            <a:r>
+              <a:rPr lang="de-DE" sz="2400" b="1" strike="noStrike" spc="-1" dirty="0" err="1">
                 <a:solidFill>
                   <a:srgbClr val="4F81BD"/>
                 </a:solidFill>
@@ -14517,10 +14559,10 @@
                 </a:uFill>
                 <a:latin typeface="Arial"/>
               </a:rPr>
-              <a:t> </a:t>
-            </a:r>
-            <a:r>
-              <a:rPr lang="de-DE" sz="2400" b="1" strike="noStrike" spc="-1" dirty="0" err="1">
+              <a:t>of</a:t>
+            </a:r>
+            <a:r>
+              <a:rPr lang="de-DE" sz="2400" b="1" strike="noStrike" spc="-1" dirty="0">
                 <a:solidFill>
                   <a:srgbClr val="4F81BD"/>
                 </a:solidFill>
@@ -14531,63 +14573,7 @@
                 </a:uFill>
                 <a:latin typeface="Arial"/>
               </a:rPr>
-              <a:t>next</a:t>
-            </a:r>
-            <a:r>
-              <a:rPr lang="de-DE" sz="2400" b="1" strike="noStrike" spc="-1" dirty="0">
-                <a:solidFill>
-                  <a:srgbClr val="4F81BD"/>
-                </a:solidFill>
-                <a:uFill>
-                  <a:solidFill>
-                    <a:srgbClr val="FFFFFF"/>
-                  </a:solidFill>
-                </a:uFill>
-                <a:latin typeface="Arial"/>
-              </a:rPr>
-              <a:t> </a:t>
-            </a:r>
-            <a:r>
-              <a:rPr lang="de-DE" sz="2400" b="1" strike="noStrike" spc="-1" dirty="0" err="1">
-                <a:solidFill>
-                  <a:srgbClr val="4F81BD"/>
-                </a:solidFill>
-                <a:uFill>
-                  <a:solidFill>
-                    <a:srgbClr val="FFFFFF"/>
-                  </a:solidFill>
-                </a:uFill>
-                <a:latin typeface="Arial"/>
-              </a:rPr>
-              <a:t>two</a:t>
-            </a:r>
-            <a:r>
-              <a:rPr lang="de-DE" sz="2400" b="1" strike="noStrike" spc="-1" dirty="0">
-                <a:solidFill>
-                  <a:srgbClr val="4F81BD"/>
-                </a:solidFill>
-                <a:uFill>
-                  <a:solidFill>
-                    <a:srgbClr val="FFFFFF"/>
-                  </a:solidFill>
-                </a:uFill>
-                <a:latin typeface="Arial"/>
-              </a:rPr>
-              <a:t> </a:t>
-            </a:r>
-            <a:r>
-              <a:rPr lang="de-DE" sz="2400" b="1" strike="noStrike" spc="-1" dirty="0" err="1">
-                <a:solidFill>
-                  <a:srgbClr val="4F81BD"/>
-                </a:solidFill>
-                <a:uFill>
-                  <a:solidFill>
-                    <a:srgbClr val="FFFFFF"/>
-                  </a:solidFill>
-                </a:uFill>
-                <a:latin typeface="Arial"/>
-              </a:rPr>
-              <a:t>days</a:t>
+              <a:t> Data</a:t>
             </a:r>
             <a:endParaRPr lang="de-DE" sz="3200" b="0" strike="noStrike" spc="-1" dirty="0">
               <a:solidFill>
@@ -14774,7 +14760,7 @@
               <a:buChar char="&gt;"/>
             </a:pPr>
             <a:r>
-              <a:rPr lang="en-US" sz="2400" b="1" spc="-1" dirty="0">
+              <a:rPr lang="en-US" sz="2400" spc="-1" dirty="0">
                 <a:solidFill>
                   <a:srgbClr val="000000"/>
                 </a:solidFill>
@@ -14784,7 +14770,7 @@
                   </a:solidFill>
                 </a:uFill>
               </a:rPr>
-              <a:t>Unstructured data (e.g. Natural Language)</a:t>
+              <a:t>Unstructured data (e.g. CSV files)</a:t>
             </a:r>
           </a:p>
           <a:p>
@@ -14810,6 +14796,31 @@
                 </a:uFill>
               </a:rPr>
               <a:t>Machine generated (e.g. server log files)</a:t>
+            </a:r>
+          </a:p>
+          <a:p>
+            <a:pPr marL="343080" indent="-342720">
+              <a:lnSpc>
+                <a:spcPct val="150000"/>
+              </a:lnSpc>
+              <a:buClr>
+                <a:srgbClr val="8064A2"/>
+              </a:buClr>
+              <a:buFont typeface="Arial"/>
+              <a:buChar char="&gt;"/>
+            </a:pPr>
+            <a:r>
+              <a:rPr lang="en-US" sz="2400" b="1" spc="-1" dirty="0">
+                <a:solidFill>
+                  <a:srgbClr val="000000"/>
+                </a:solidFill>
+                <a:uFill>
+                  <a:solidFill>
+                    <a:srgbClr val="FFFFFF"/>
+                  </a:solidFill>
+                </a:uFill>
+              </a:rPr>
+              <a:t>Natural Language</a:t>
             </a:r>
           </a:p>
           <a:p>
@@ -14933,7 +14944,7 @@
     </p:spTree>
     <p:extLst>
       <p:ext uri="{BB962C8B-B14F-4D97-AF65-F5344CB8AC3E}">
-        <p14:creationId xmlns:p14="http://schemas.microsoft.com/office/powerpoint/2010/main" val="3775106332"/>
+        <p14:creationId xmlns:p14="http://schemas.microsoft.com/office/powerpoint/2010/main" val="1295188072"/>
       </p:ext>
     </p:extLst>
   </p:cSld>
@@ -19673,15 +19684,7 @@
             </a:r>
             <a:r>
               <a:rPr lang="de-DE" dirty="0"/>
-              <a:t> </a:t>
-            </a:r>
-            <a:r>
-              <a:rPr lang="de-DE" dirty="0" err="1"/>
-              <a:t>no</a:t>
-            </a:r>
-            <a:r>
-              <a:rPr lang="de-DE" dirty="0"/>
-              <a:t>, </a:t>
+              <a:t> not, </a:t>
             </a:r>
             <a:r>
               <a:rPr lang="de-DE" dirty="0" err="1"/>
@@ -21010,8 +21013,8 @@
         </p:nvSpPr>
         <p:spPr>
           <a:xfrm>
-            <a:off x="25644" y="1277331"/>
-            <a:ext cx="8505136" cy="539201"/>
+            <a:off x="25644" y="1250371"/>
+            <a:ext cx="8505136" cy="593121"/>
           </a:xfrm>
           <a:prstGeom prst="rect">
             <a:avLst/>
@@ -22601,859 +22604,6 @@
       </p:grpSpPr>
       <p:sp>
         <p:nvSpPr>
-          <p:cNvPr id="11" name="Text Placeholder 10">
-            <a:extLst>
-              <a:ext uri="{FF2B5EF4-FFF2-40B4-BE49-F238E27FC236}">
-                <a16:creationId xmlns:a16="http://schemas.microsoft.com/office/drawing/2014/main" id="{CB0B60E0-7506-46F0-A3E8-0F8789D2116F}"/>
-              </a:ext>
-            </a:extLst>
-          </p:cNvPr>
-          <p:cNvSpPr>
-            <a:spLocks noGrp="1"/>
-          </p:cNvSpPr>
-          <p:nvPr>
-            <p:ph type="body" sz="quarter" idx="13"/>
-          </p:nvPr>
-        </p:nvSpPr>
-        <p:spPr/>
-        <p:txBody>
-          <a:bodyPr/>
-          <a:lstStyle/>
-          <a:p>
-            <a:r>
-              <a:rPr lang="de-DE" dirty="0"/>
-              <a:t>Summary and </a:t>
-            </a:r>
-            <a:r>
-              <a:rPr lang="de-DE" dirty="0" err="1"/>
-              <a:t>terms</a:t>
-            </a:r>
-            <a:endParaRPr lang="de-DE" dirty="0"/>
-          </a:p>
-        </p:txBody>
-      </p:sp>
-      <p:sp>
-        <p:nvSpPr>
-          <p:cNvPr id="5" name="Textplatzhalter 4"/>
-          <p:cNvSpPr>
-            <a:spLocks noGrp="1"/>
-          </p:cNvSpPr>
-          <p:nvPr>
-            <p:ph type="body" sz="quarter" idx="10"/>
-          </p:nvPr>
-        </p:nvSpPr>
-        <p:spPr/>
-        <p:txBody>
-          <a:bodyPr/>
-          <a:lstStyle/>
-          <a:p>
-            <a:pPr>
-              <a:lnSpc>
-                <a:spcPct val="100000"/>
-              </a:lnSpc>
-            </a:pPr>
-            <a:r>
-              <a:rPr lang="de-DE" spc="-1" dirty="0" err="1">
-                <a:solidFill>
-                  <a:srgbClr val="000000"/>
-                </a:solidFill>
-                <a:uFill>
-                  <a:solidFill>
-                    <a:srgbClr val="FFFFFF"/>
-                  </a:solidFill>
-                </a:uFill>
-              </a:rPr>
-              <a:t>Neural</a:t>
-            </a:r>
-            <a:r>
-              <a:rPr lang="de-DE" spc="-1" dirty="0">
-                <a:solidFill>
-                  <a:srgbClr val="000000"/>
-                </a:solidFill>
-                <a:uFill>
-                  <a:solidFill>
-                    <a:srgbClr val="FFFFFF"/>
-                  </a:solidFill>
-                </a:uFill>
-              </a:rPr>
-              <a:t> Network Basics</a:t>
-            </a:r>
-            <a:endParaRPr lang="de-DE" sz="3200" b="0" spc="-1" dirty="0">
-              <a:solidFill>
-                <a:srgbClr val="000000"/>
-              </a:solidFill>
-              <a:uFill>
-                <a:solidFill>
-                  <a:srgbClr val="FFFFFF"/>
-                </a:solidFill>
-              </a:uFill>
-            </a:endParaRPr>
-          </a:p>
-        </p:txBody>
-      </p:sp>
-      <p:sp>
-        <p:nvSpPr>
-          <p:cNvPr id="9" name="Content Placeholder 2">
-            <a:extLst>
-              <a:ext uri="{FF2B5EF4-FFF2-40B4-BE49-F238E27FC236}">
-                <a16:creationId xmlns:a16="http://schemas.microsoft.com/office/drawing/2014/main" id="{6C7988C1-DCF0-4944-9BDF-B77B8823810C}"/>
-              </a:ext>
-            </a:extLst>
-          </p:cNvPr>
-          <p:cNvSpPr>
-            <a:spLocks noGrp="1"/>
-          </p:cNvSpPr>
-          <p:nvPr>
-            <p:ph sz="quarter" idx="12"/>
-          </p:nvPr>
-        </p:nvSpPr>
-        <p:spPr>
-          <a:xfrm>
-            <a:off x="468312" y="1989139"/>
-            <a:ext cx="8207373" cy="4248150"/>
-          </a:xfrm>
-        </p:spPr>
-        <p:txBody>
-          <a:bodyPr/>
-          <a:lstStyle/>
-          <a:p>
-            <a:pPr>
-              <a:lnSpc>
-                <a:spcPct val="150000"/>
-              </a:lnSpc>
-            </a:pPr>
-            <a:r>
-              <a:rPr lang="de-DE" sz="1800" b="1" dirty="0"/>
-              <a:t>Input: </a:t>
-            </a:r>
-            <a:r>
-              <a:rPr lang="de-DE" sz="1800" dirty="0" err="1"/>
-              <a:t>Numerical</a:t>
-            </a:r>
-            <a:r>
-              <a:rPr lang="de-DE" sz="1800" dirty="0"/>
-              <a:t> </a:t>
-            </a:r>
-            <a:r>
-              <a:rPr lang="de-DE" sz="1800" dirty="0" err="1"/>
-              <a:t>vectors</a:t>
-            </a:r>
-            <a:r>
-              <a:rPr lang="de-DE" sz="1800" dirty="0"/>
-              <a:t> </a:t>
-            </a:r>
-            <a:r>
-              <a:rPr lang="de-DE" sz="1800" dirty="0" err="1"/>
-              <a:t>or</a:t>
-            </a:r>
-            <a:r>
-              <a:rPr lang="de-DE" sz="1800" dirty="0"/>
-              <a:t> </a:t>
-            </a:r>
-            <a:r>
-              <a:rPr lang="de-DE" sz="1800" dirty="0" err="1"/>
-              <a:t>matrices</a:t>
-            </a:r>
-            <a:r>
-              <a:rPr lang="de-DE" sz="1800" dirty="0"/>
-              <a:t>  </a:t>
-            </a:r>
-          </a:p>
-          <a:p>
-            <a:pPr>
-              <a:lnSpc>
-                <a:spcPct val="100000"/>
-              </a:lnSpc>
-            </a:pPr>
-            <a:r>
-              <a:rPr lang="de-DE" sz="1800" b="1" dirty="0" err="1"/>
-              <a:t>Activation</a:t>
-            </a:r>
-            <a:r>
-              <a:rPr lang="de-DE" sz="1800" b="1" dirty="0"/>
-              <a:t>:</a:t>
-            </a:r>
-            <a:r>
-              <a:rPr lang="de-DE" sz="1800" dirty="0"/>
-              <a:t> Can </a:t>
-            </a:r>
-            <a:r>
-              <a:rPr lang="de-DE" sz="1800" dirty="0" err="1"/>
-              <a:t>be</a:t>
-            </a:r>
-            <a:r>
-              <a:rPr lang="de-DE" sz="1800" dirty="0"/>
-              <a:t> a </a:t>
-            </a:r>
-            <a:r>
-              <a:rPr lang="de-DE" sz="1800" dirty="0" err="1"/>
-              <a:t>threshold</a:t>
-            </a:r>
-            <a:r>
-              <a:rPr lang="de-DE" sz="1800" dirty="0"/>
-              <a:t> </a:t>
-            </a:r>
-            <a:r>
-              <a:rPr lang="de-DE" sz="1800" dirty="0" err="1"/>
-              <a:t>or</a:t>
-            </a:r>
-            <a:r>
-              <a:rPr lang="de-DE" sz="1800" dirty="0"/>
-              <a:t> </a:t>
-            </a:r>
-            <a:r>
-              <a:rPr lang="de-DE" sz="1800" dirty="0" err="1"/>
-              <a:t>other</a:t>
-            </a:r>
-            <a:r>
-              <a:rPr lang="de-DE" sz="1800" dirty="0"/>
-              <a:t> </a:t>
-            </a:r>
-            <a:r>
-              <a:rPr lang="de-DE" sz="1800" dirty="0" err="1"/>
-              <a:t>functions</a:t>
-            </a:r>
-            <a:r>
-              <a:rPr lang="de-DE" sz="1800" dirty="0"/>
-              <a:t> </a:t>
-            </a:r>
-            <a:r>
-              <a:rPr lang="de-DE" sz="1800" dirty="0" err="1"/>
-              <a:t>to</a:t>
-            </a:r>
-            <a:r>
-              <a:rPr lang="de-DE" sz="1800" dirty="0"/>
-              <a:t> </a:t>
-            </a:r>
-            <a:r>
-              <a:rPr lang="de-DE" sz="1800" dirty="0" err="1"/>
-              <a:t>determine</a:t>
-            </a:r>
-            <a:r>
-              <a:rPr lang="de-DE" sz="1800" dirty="0"/>
-              <a:t> </a:t>
-            </a:r>
-            <a:r>
-              <a:rPr lang="de-DE" sz="1800" dirty="0" err="1"/>
-              <a:t>if</a:t>
-            </a:r>
-            <a:r>
-              <a:rPr lang="de-DE" sz="1800" dirty="0"/>
-              <a:t> Neuron </a:t>
-            </a:r>
-            <a:r>
-              <a:rPr lang="de-DE" sz="1800" dirty="0" err="1"/>
-              <a:t>fires</a:t>
-            </a:r>
-            <a:r>
-              <a:rPr lang="de-DE" sz="1800" dirty="0"/>
-              <a:t> </a:t>
-            </a:r>
-            <a:r>
-              <a:rPr lang="de-DE" sz="1800" dirty="0" err="1"/>
-              <a:t>or</a:t>
-            </a:r>
-            <a:r>
-              <a:rPr lang="de-DE" sz="1800" dirty="0"/>
-              <a:t> not („0“ </a:t>
-            </a:r>
-            <a:r>
-              <a:rPr lang="de-DE" sz="1800" dirty="0" err="1"/>
-              <a:t>or</a:t>
-            </a:r>
-            <a:r>
-              <a:rPr lang="de-DE" sz="1800" dirty="0"/>
-              <a:t> „1“)</a:t>
-            </a:r>
-          </a:p>
-          <a:p>
-            <a:pPr>
-              <a:lnSpc>
-                <a:spcPct val="100000"/>
-              </a:lnSpc>
-            </a:pPr>
-            <a:r>
-              <a:rPr lang="de-DE" sz="1800" b="1" dirty="0"/>
-              <a:t>Learning rate:</a:t>
-            </a:r>
-            <a:r>
-              <a:rPr lang="de-DE" sz="1800" dirty="0"/>
-              <a:t> </a:t>
-            </a:r>
-            <a:r>
-              <a:rPr lang="de-DE" sz="1800" dirty="0" err="1"/>
-              <a:t>Determines</a:t>
-            </a:r>
-            <a:r>
-              <a:rPr lang="de-DE" sz="1800" dirty="0"/>
-              <a:t> </a:t>
-            </a:r>
-            <a:r>
-              <a:rPr lang="de-DE" sz="1800" dirty="0" err="1"/>
-              <a:t>how</a:t>
-            </a:r>
-            <a:r>
-              <a:rPr lang="de-DE" sz="1800" dirty="0"/>
-              <a:t> fast an </a:t>
-            </a:r>
-            <a:r>
-              <a:rPr lang="de-DE" sz="1800" dirty="0" err="1"/>
-              <a:t>algorithm</a:t>
-            </a:r>
-            <a:r>
-              <a:rPr lang="de-DE" sz="1800" dirty="0"/>
-              <a:t> </a:t>
-            </a:r>
-            <a:r>
-              <a:rPr lang="de-DE" sz="1800" dirty="0" err="1"/>
-              <a:t>should</a:t>
-            </a:r>
-            <a:r>
-              <a:rPr lang="de-DE" sz="1800" dirty="0"/>
-              <a:t> </a:t>
-            </a:r>
-            <a:r>
-              <a:rPr lang="de-DE" sz="1800" dirty="0" err="1"/>
-              <a:t>adjust</a:t>
-            </a:r>
-            <a:r>
-              <a:rPr lang="de-DE" sz="1800" dirty="0"/>
-              <a:t> </a:t>
-            </a:r>
-            <a:r>
-              <a:rPr lang="de-DE" sz="1800" dirty="0" err="1"/>
-              <a:t>to</a:t>
-            </a:r>
-            <a:r>
-              <a:rPr lang="de-DE" sz="1800" dirty="0"/>
-              <a:t> </a:t>
-            </a:r>
-            <a:r>
-              <a:rPr lang="de-DE" sz="1800" dirty="0" err="1"/>
-              <a:t>new</a:t>
-            </a:r>
-            <a:r>
-              <a:rPr lang="de-DE" sz="1800" dirty="0"/>
-              <a:t> </a:t>
-            </a:r>
-            <a:r>
-              <a:rPr lang="de-DE" sz="1800" dirty="0" err="1"/>
-              <a:t>data</a:t>
-            </a:r>
-            <a:r>
-              <a:rPr lang="de-DE" sz="1800" dirty="0"/>
-              <a:t>. A high </a:t>
-            </a:r>
-            <a:r>
-              <a:rPr lang="de-DE" sz="1800" dirty="0" err="1"/>
-              <a:t>learning</a:t>
-            </a:r>
-            <a:r>
-              <a:rPr lang="de-DE" sz="1800" dirty="0"/>
-              <a:t> rate </a:t>
-            </a:r>
-            <a:r>
-              <a:rPr lang="de-DE" sz="1800" dirty="0" err="1"/>
-              <a:t>adjusts</a:t>
-            </a:r>
-            <a:r>
-              <a:rPr lang="de-DE" sz="1800" dirty="0"/>
-              <a:t> </a:t>
-            </a:r>
-            <a:r>
-              <a:rPr lang="de-DE" sz="1800" dirty="0" err="1"/>
-              <a:t>better</a:t>
-            </a:r>
-            <a:r>
-              <a:rPr lang="de-DE" sz="1800" dirty="0"/>
-              <a:t> and </a:t>
-            </a:r>
-            <a:r>
-              <a:rPr lang="de-DE" sz="1800" dirty="0" err="1"/>
-              <a:t>faster</a:t>
-            </a:r>
-            <a:r>
-              <a:rPr lang="de-DE" sz="1800" dirty="0"/>
-              <a:t> </a:t>
-            </a:r>
-            <a:r>
-              <a:rPr lang="de-DE" sz="1800" dirty="0" err="1"/>
-              <a:t>to</a:t>
-            </a:r>
-            <a:r>
-              <a:rPr lang="de-DE" sz="1800" dirty="0"/>
-              <a:t> </a:t>
-            </a:r>
-            <a:r>
-              <a:rPr lang="de-DE" sz="1800" dirty="0" err="1"/>
-              <a:t>new</a:t>
-            </a:r>
-            <a:r>
-              <a:rPr lang="de-DE" sz="1800" dirty="0"/>
-              <a:t> </a:t>
-            </a:r>
-            <a:r>
-              <a:rPr lang="de-DE" sz="1800" dirty="0" err="1"/>
-              <a:t>data</a:t>
-            </a:r>
-            <a:r>
-              <a:rPr lang="de-DE" sz="1800" dirty="0"/>
-              <a:t> but also </a:t>
-            </a:r>
-            <a:r>
-              <a:rPr lang="de-DE" sz="1800" dirty="0" err="1"/>
-              <a:t>discards</a:t>
-            </a:r>
-            <a:r>
-              <a:rPr lang="de-DE" sz="1800" dirty="0"/>
-              <a:t> </a:t>
-            </a:r>
-            <a:r>
-              <a:rPr lang="de-DE" sz="1800" dirty="0" err="1"/>
-              <a:t>learned</a:t>
-            </a:r>
-            <a:r>
-              <a:rPr lang="de-DE" sz="1800" dirty="0"/>
-              <a:t> </a:t>
-            </a:r>
-            <a:r>
-              <a:rPr lang="de-DE" sz="1800" dirty="0" err="1"/>
-              <a:t>circumstances</a:t>
-            </a:r>
-            <a:endParaRPr lang="de-DE" sz="1800" dirty="0"/>
-          </a:p>
-          <a:p>
-            <a:pPr>
-              <a:lnSpc>
-                <a:spcPct val="150000"/>
-              </a:lnSpc>
-            </a:pPr>
-            <a:r>
-              <a:rPr lang="de-DE" sz="1800" b="1" dirty="0"/>
-              <a:t>Optimizer:</a:t>
-            </a:r>
-            <a:r>
-              <a:rPr lang="de-DE" sz="1800" dirty="0"/>
-              <a:t> </a:t>
-            </a:r>
-            <a:r>
-              <a:rPr lang="de-DE" sz="1800" dirty="0" err="1"/>
-              <a:t>Function</a:t>
-            </a:r>
-            <a:r>
-              <a:rPr lang="de-DE" sz="1800" dirty="0"/>
-              <a:t> </a:t>
-            </a:r>
-            <a:r>
-              <a:rPr lang="de-DE" sz="1800" dirty="0" err="1"/>
-              <a:t>to</a:t>
-            </a:r>
-            <a:r>
-              <a:rPr lang="de-DE" sz="1800" dirty="0"/>
-              <a:t> </a:t>
-            </a:r>
-            <a:r>
-              <a:rPr lang="de-DE" sz="1800" dirty="0" err="1"/>
-              <a:t>optimize</a:t>
-            </a:r>
-            <a:r>
-              <a:rPr lang="de-DE" sz="1800" dirty="0"/>
-              <a:t> </a:t>
-            </a:r>
-            <a:r>
-              <a:rPr lang="de-DE" sz="1800" dirty="0" err="1"/>
-              <a:t>model</a:t>
-            </a:r>
-            <a:r>
-              <a:rPr lang="de-DE" sz="1800" dirty="0"/>
-              <a:t> (i.e. </a:t>
-            </a:r>
-            <a:r>
-              <a:rPr lang="de-DE" sz="1800" dirty="0" err="1"/>
-              <a:t>weights</a:t>
-            </a:r>
-            <a:r>
-              <a:rPr lang="de-DE" sz="1800" dirty="0"/>
-              <a:t>)</a:t>
-            </a:r>
-          </a:p>
-          <a:p>
-            <a:pPr>
-              <a:lnSpc>
-                <a:spcPct val="100000"/>
-              </a:lnSpc>
-            </a:pPr>
-            <a:r>
-              <a:rPr lang="de-DE" sz="1800" b="1" dirty="0" err="1"/>
-              <a:t>Epochs</a:t>
-            </a:r>
-            <a:r>
-              <a:rPr lang="de-DE" sz="1800" b="1" dirty="0"/>
-              <a:t>:</a:t>
-            </a:r>
-            <a:r>
-              <a:rPr lang="de-DE" sz="1800" dirty="0"/>
-              <a:t> An </a:t>
-            </a:r>
-            <a:r>
-              <a:rPr lang="de-DE" sz="1800" dirty="0" err="1"/>
-              <a:t>epoch</a:t>
-            </a:r>
-            <a:r>
-              <a:rPr lang="de-DE" sz="1800" dirty="0"/>
-              <a:t> </a:t>
-            </a:r>
-            <a:r>
-              <a:rPr lang="de-DE" sz="1800" dirty="0" err="1"/>
-              <a:t>is</a:t>
-            </a:r>
-            <a:r>
-              <a:rPr lang="de-DE" sz="1800" dirty="0"/>
-              <a:t> a </a:t>
-            </a:r>
-            <a:r>
-              <a:rPr lang="de-DE" sz="1800" dirty="0" err="1"/>
-              <a:t>whole</a:t>
-            </a:r>
-            <a:r>
-              <a:rPr lang="de-DE" sz="1800" dirty="0"/>
-              <a:t> </a:t>
-            </a:r>
-            <a:r>
-              <a:rPr lang="de-DE" sz="1800" dirty="0" err="1"/>
-              <a:t>iteration</a:t>
-            </a:r>
-            <a:r>
-              <a:rPr lang="de-DE" sz="1800" dirty="0"/>
-              <a:t> </a:t>
-            </a:r>
-            <a:r>
-              <a:rPr lang="de-DE" sz="1800" dirty="0" err="1"/>
-              <a:t>of</a:t>
-            </a:r>
-            <a:r>
-              <a:rPr lang="de-DE" sz="1800" dirty="0"/>
-              <a:t> </a:t>
-            </a:r>
-            <a:r>
-              <a:rPr lang="de-DE" sz="1800" dirty="0" err="1"/>
-              <a:t>than</a:t>
-            </a:r>
-            <a:r>
-              <a:rPr lang="de-DE" sz="1800" dirty="0"/>
-              <a:t> </a:t>
-            </a:r>
-            <a:r>
-              <a:rPr lang="de-DE" sz="1800" dirty="0" err="1"/>
-              <a:t>one</a:t>
-            </a:r>
-            <a:r>
-              <a:rPr lang="de-DE" sz="1800" dirty="0"/>
-              <a:t> </a:t>
-            </a:r>
-            <a:r>
-              <a:rPr lang="de-DE" sz="1800" dirty="0" err="1"/>
-              <a:t>iteration</a:t>
-            </a:r>
-            <a:r>
-              <a:rPr lang="de-DE" sz="1800" dirty="0"/>
-              <a:t> </a:t>
-            </a:r>
-            <a:r>
-              <a:rPr lang="de-DE" sz="1800" dirty="0" err="1"/>
-              <a:t>of</a:t>
-            </a:r>
-            <a:r>
-              <a:rPr lang="de-DE" sz="1800" dirty="0"/>
-              <a:t> all </a:t>
-            </a:r>
-            <a:r>
-              <a:rPr lang="de-DE" sz="1800" dirty="0" err="1"/>
-              <a:t>data</a:t>
-            </a:r>
-            <a:r>
-              <a:rPr lang="de-DE" sz="1800" dirty="0"/>
-              <a:t> </a:t>
-            </a:r>
-            <a:r>
-              <a:rPr lang="de-DE" sz="1800" dirty="0" err="1"/>
-              <a:t>to</a:t>
-            </a:r>
-            <a:r>
-              <a:rPr lang="de-DE" sz="1800" dirty="0"/>
-              <a:t> </a:t>
-            </a:r>
-            <a:r>
-              <a:rPr lang="de-DE" sz="1800" dirty="0" err="1"/>
-              <a:t>have</a:t>
-            </a:r>
-            <a:r>
-              <a:rPr lang="de-DE" sz="1800" dirty="0"/>
-              <a:t> an optimal </a:t>
-            </a:r>
-            <a:r>
-              <a:rPr lang="de-DE" sz="1800" dirty="0" err="1"/>
-              <a:t>model</a:t>
-            </a:r>
-            <a:r>
-              <a:rPr lang="de-DE" sz="1800" dirty="0"/>
-              <a:t> </a:t>
-            </a:r>
-            <a:r>
-              <a:rPr lang="de-DE" sz="1800" dirty="0" err="1"/>
-              <a:t>for</a:t>
-            </a:r>
-            <a:r>
-              <a:rPr lang="de-DE" sz="1800" dirty="0"/>
-              <a:t> </a:t>
-            </a:r>
-            <a:r>
-              <a:rPr lang="de-DE" sz="1800" dirty="0" err="1"/>
-              <a:t>the</a:t>
-            </a:r>
-            <a:r>
-              <a:rPr lang="de-DE" sz="1800" dirty="0"/>
-              <a:t> </a:t>
-            </a:r>
-            <a:r>
-              <a:rPr lang="de-DE" sz="1800" dirty="0" err="1"/>
-              <a:t>given</a:t>
-            </a:r>
-            <a:r>
-              <a:rPr lang="de-DE" sz="1800" dirty="0"/>
-              <a:t> </a:t>
-            </a:r>
-            <a:r>
-              <a:rPr lang="de-DE" sz="1800" dirty="0" err="1"/>
-              <a:t>problemall</a:t>
-            </a:r>
-            <a:r>
-              <a:rPr lang="de-DE" sz="1800" dirty="0"/>
-              <a:t> </a:t>
-            </a:r>
-            <a:r>
-              <a:rPr lang="de-DE" sz="1800" dirty="0" err="1"/>
-              <a:t>input</a:t>
-            </a:r>
-            <a:r>
-              <a:rPr lang="de-DE" sz="1800" dirty="0"/>
-              <a:t> </a:t>
-            </a:r>
-            <a:r>
-              <a:rPr lang="de-DE" sz="1800" dirty="0" err="1"/>
-              <a:t>data</a:t>
-            </a:r>
-            <a:r>
-              <a:rPr lang="de-DE" sz="1800" dirty="0"/>
-              <a:t>. </a:t>
-            </a:r>
-            <a:r>
-              <a:rPr lang="de-DE" sz="1800" dirty="0" err="1"/>
-              <a:t>Algorithms</a:t>
-            </a:r>
-            <a:r>
-              <a:rPr lang="de-DE" sz="1800" dirty="0"/>
-              <a:t> </a:t>
-            </a:r>
-            <a:r>
-              <a:rPr lang="de-DE" sz="1800" dirty="0" err="1"/>
-              <a:t>need</a:t>
-            </a:r>
-            <a:r>
-              <a:rPr lang="de-DE" sz="1800" dirty="0"/>
-              <a:t> </a:t>
-            </a:r>
-            <a:r>
-              <a:rPr lang="de-DE" sz="1800" dirty="0" err="1"/>
-              <a:t>more</a:t>
-            </a:r>
-            <a:endParaRPr lang="de-DE" sz="1800" dirty="0"/>
-          </a:p>
-          <a:p>
-            <a:pPr>
-              <a:lnSpc>
-                <a:spcPct val="100000"/>
-              </a:lnSpc>
-            </a:pPr>
-            <a:r>
-              <a:rPr lang="de-DE" sz="1800" b="1" dirty="0"/>
-              <a:t>Batches:</a:t>
-            </a:r>
-            <a:r>
-              <a:rPr lang="de-DE" sz="1800" dirty="0"/>
-              <a:t> </a:t>
-            </a:r>
-            <a:r>
-              <a:rPr lang="de-DE" sz="1800" dirty="0" err="1"/>
-              <a:t>Sometimes</a:t>
-            </a:r>
-            <a:r>
-              <a:rPr lang="de-DE" sz="1800" dirty="0"/>
-              <a:t> </a:t>
-            </a:r>
-            <a:r>
-              <a:rPr lang="de-DE" sz="1800" dirty="0" err="1"/>
-              <a:t>data</a:t>
-            </a:r>
-            <a:r>
-              <a:rPr lang="de-DE" sz="1800" dirty="0"/>
-              <a:t> </a:t>
-            </a:r>
-            <a:r>
-              <a:rPr lang="de-DE" sz="1800" dirty="0" err="1"/>
-              <a:t>is</a:t>
-            </a:r>
-            <a:r>
-              <a:rPr lang="de-DE" sz="1800" dirty="0"/>
-              <a:t> </a:t>
-            </a:r>
-            <a:r>
-              <a:rPr lang="de-DE" sz="1800" dirty="0" err="1"/>
-              <a:t>too</a:t>
-            </a:r>
-            <a:r>
-              <a:rPr lang="de-DE" sz="1800" dirty="0"/>
-              <a:t> </a:t>
-            </a:r>
-            <a:r>
-              <a:rPr lang="de-DE" sz="1800" dirty="0" err="1"/>
-              <a:t>big</a:t>
-            </a:r>
-            <a:r>
-              <a:rPr lang="de-DE" sz="1800" dirty="0"/>
-              <a:t> </a:t>
-            </a:r>
-            <a:r>
-              <a:rPr lang="de-DE" sz="1800" dirty="0" err="1"/>
-              <a:t>to</a:t>
-            </a:r>
-            <a:r>
-              <a:rPr lang="de-DE" sz="1800" dirty="0"/>
-              <a:t> </a:t>
-            </a:r>
-            <a:r>
-              <a:rPr lang="de-DE" sz="1800" dirty="0" err="1"/>
-              <a:t>put</a:t>
-            </a:r>
-            <a:r>
-              <a:rPr lang="de-DE" sz="1800" dirty="0"/>
-              <a:t> fully </a:t>
-            </a:r>
-            <a:r>
-              <a:rPr lang="de-DE" sz="1800" dirty="0" err="1"/>
-              <a:t>into</a:t>
-            </a:r>
-            <a:r>
-              <a:rPr lang="de-DE" sz="1800" dirty="0"/>
-              <a:t> RAM. </a:t>
-            </a:r>
-            <a:r>
-              <a:rPr lang="de-DE" sz="1800" dirty="0" err="1"/>
-              <a:t>Then</a:t>
-            </a:r>
-            <a:r>
-              <a:rPr lang="de-DE" sz="1800" dirty="0"/>
-              <a:t> </a:t>
-            </a:r>
-            <a:r>
-              <a:rPr lang="de-DE" sz="1800" dirty="0" err="1"/>
-              <a:t>it</a:t>
-            </a:r>
-            <a:r>
-              <a:rPr lang="de-DE" sz="1800" dirty="0"/>
-              <a:t> </a:t>
-            </a:r>
-            <a:r>
-              <a:rPr lang="de-DE" sz="1800" dirty="0" err="1"/>
-              <a:t>needs</a:t>
-            </a:r>
-            <a:r>
-              <a:rPr lang="de-DE" sz="1800" dirty="0"/>
-              <a:t> </a:t>
-            </a:r>
-            <a:r>
-              <a:rPr lang="de-DE" sz="1800" dirty="0" err="1"/>
-              <a:t>to</a:t>
-            </a:r>
-            <a:r>
-              <a:rPr lang="de-DE" sz="1800" dirty="0"/>
-              <a:t> </a:t>
-            </a:r>
-            <a:r>
-              <a:rPr lang="de-DE" sz="1800" dirty="0" err="1"/>
-              <a:t>be</a:t>
-            </a:r>
-            <a:r>
-              <a:rPr lang="de-DE" sz="1800" dirty="0"/>
-              <a:t> </a:t>
-            </a:r>
-            <a:r>
-              <a:rPr lang="de-DE" sz="1800" dirty="0" err="1"/>
-              <a:t>processed</a:t>
-            </a:r>
-            <a:r>
-              <a:rPr lang="de-DE" sz="1800" dirty="0"/>
-              <a:t> </a:t>
-            </a:r>
-            <a:r>
-              <a:rPr lang="de-DE" sz="1800" dirty="0" err="1"/>
-              <a:t>into</a:t>
-            </a:r>
-            <a:r>
-              <a:rPr lang="de-DE" sz="1800" dirty="0"/>
-              <a:t> </a:t>
-            </a:r>
-            <a:r>
-              <a:rPr lang="de-DE" sz="1800" dirty="0" err="1"/>
-              <a:t>slices</a:t>
-            </a:r>
-            <a:r>
-              <a:rPr lang="de-DE" sz="1800" dirty="0"/>
-              <a:t> (aka </a:t>
-            </a:r>
-            <a:r>
-              <a:rPr lang="de-DE" sz="1800" dirty="0" err="1"/>
-              <a:t>batches</a:t>
-            </a:r>
-            <a:r>
-              <a:rPr lang="de-DE" sz="1800" dirty="0"/>
-              <a:t>).</a:t>
-            </a:r>
-          </a:p>
-        </p:txBody>
-      </p:sp>
-    </p:spTree>
-    <p:extLst>
-      <p:ext uri="{BB962C8B-B14F-4D97-AF65-F5344CB8AC3E}">
-        <p14:creationId xmlns:p14="http://schemas.microsoft.com/office/powerpoint/2010/main" val="949343435"/>
-      </p:ext>
-    </p:extLst>
-  </p:cSld>
-  <p:clrMapOvr>
-    <a:masterClrMapping/>
-  </p:clrMapOvr>
-</p:sld>
-</file>
-
-<file path=ppt/slides/slide34.xml><?xml version="1.0" encoding="utf-8"?>
-<p:sld xmlns:a="http://schemas.openxmlformats.org/drawingml/2006/main" xmlns:r="http://schemas.openxmlformats.org/officeDocument/2006/relationships" xmlns:p="http://schemas.openxmlformats.org/presentationml/2006/main">
-  <p:cSld>
-    <p:spTree>
-      <p:nvGrpSpPr>
-        <p:cNvPr id="1" name=""/>
-        <p:cNvGrpSpPr/>
-        <p:nvPr/>
-      </p:nvGrpSpPr>
-      <p:grpSpPr>
-        <a:xfrm>
-          <a:off x="0" y="0"/>
-          <a:ext cx="0" cy="0"/>
-          <a:chOff x="0" y="0"/>
-          <a:chExt cx="0" cy="0"/>
-        </a:xfrm>
-      </p:grpSpPr>
-      <p:sp>
-        <p:nvSpPr>
           <p:cNvPr id="192" name="TextShape 1"/>
           <p:cNvSpPr txBox="1"/>
           <p:nvPr/>
@@ -24179,6 +23329,915 @@
 </p:sld>
 </file>
 
+<file path=ppt/slides/slide34.xml><?xml version="1.0" encoding="utf-8"?>
+<p:sld xmlns:a="http://schemas.openxmlformats.org/drawingml/2006/main" xmlns:r="http://schemas.openxmlformats.org/officeDocument/2006/relationships" xmlns:p="http://schemas.openxmlformats.org/presentationml/2006/main">
+  <p:cSld>
+    <p:spTree>
+      <p:nvGrpSpPr>
+        <p:cNvPr id="1" name=""/>
+        <p:cNvGrpSpPr/>
+        <p:nvPr/>
+      </p:nvGrpSpPr>
+      <p:grpSpPr>
+        <a:xfrm>
+          <a:off x="0" y="0"/>
+          <a:ext cx="0" cy="0"/>
+          <a:chOff x="0" y="0"/>
+          <a:chExt cx="0" cy="0"/>
+        </a:xfrm>
+      </p:grpSpPr>
+      <p:sp>
+        <p:nvSpPr>
+          <p:cNvPr id="11" name="Text Placeholder 10">
+            <a:extLst>
+              <a:ext uri="{FF2B5EF4-FFF2-40B4-BE49-F238E27FC236}">
+                <a16:creationId xmlns:a16="http://schemas.microsoft.com/office/drawing/2014/main" id="{CB0B60E0-7506-46F0-A3E8-0F8789D2116F}"/>
+              </a:ext>
+            </a:extLst>
+          </p:cNvPr>
+          <p:cNvSpPr>
+            <a:spLocks noGrp="1"/>
+          </p:cNvSpPr>
+          <p:nvPr>
+            <p:ph type="body" sz="quarter" idx="13"/>
+          </p:nvPr>
+        </p:nvSpPr>
+        <p:spPr/>
+        <p:txBody>
+          <a:bodyPr/>
+          <a:lstStyle/>
+          <a:p>
+            <a:r>
+              <a:rPr lang="de-DE" dirty="0"/>
+              <a:t>Summary and </a:t>
+            </a:r>
+            <a:r>
+              <a:rPr lang="de-DE" dirty="0" err="1"/>
+              <a:t>terms</a:t>
+            </a:r>
+            <a:endParaRPr lang="de-DE" dirty="0"/>
+          </a:p>
+        </p:txBody>
+      </p:sp>
+      <p:sp>
+        <p:nvSpPr>
+          <p:cNvPr id="5" name="Textplatzhalter 4"/>
+          <p:cNvSpPr>
+            <a:spLocks noGrp="1"/>
+          </p:cNvSpPr>
+          <p:nvPr>
+            <p:ph type="body" sz="quarter" idx="10"/>
+          </p:nvPr>
+        </p:nvSpPr>
+        <p:spPr/>
+        <p:txBody>
+          <a:bodyPr/>
+          <a:lstStyle/>
+          <a:p>
+            <a:pPr>
+              <a:lnSpc>
+                <a:spcPct val="100000"/>
+              </a:lnSpc>
+            </a:pPr>
+            <a:r>
+              <a:rPr lang="de-DE" spc="-1" dirty="0" err="1">
+                <a:solidFill>
+                  <a:srgbClr val="000000"/>
+                </a:solidFill>
+                <a:uFill>
+                  <a:solidFill>
+                    <a:srgbClr val="FFFFFF"/>
+                  </a:solidFill>
+                </a:uFill>
+              </a:rPr>
+              <a:t>Neural</a:t>
+            </a:r>
+            <a:r>
+              <a:rPr lang="de-DE" spc="-1" dirty="0">
+                <a:solidFill>
+                  <a:srgbClr val="000000"/>
+                </a:solidFill>
+                <a:uFill>
+                  <a:solidFill>
+                    <a:srgbClr val="FFFFFF"/>
+                  </a:solidFill>
+                </a:uFill>
+              </a:rPr>
+              <a:t> Network Basics</a:t>
+            </a:r>
+            <a:endParaRPr lang="de-DE" sz="3200" b="0" spc="-1" dirty="0">
+              <a:solidFill>
+                <a:srgbClr val="000000"/>
+              </a:solidFill>
+              <a:uFill>
+                <a:solidFill>
+                  <a:srgbClr val="FFFFFF"/>
+                </a:solidFill>
+              </a:uFill>
+            </a:endParaRPr>
+          </a:p>
+        </p:txBody>
+      </p:sp>
+      <p:sp>
+        <p:nvSpPr>
+          <p:cNvPr id="9" name="Content Placeholder 2">
+            <a:extLst>
+              <a:ext uri="{FF2B5EF4-FFF2-40B4-BE49-F238E27FC236}">
+                <a16:creationId xmlns:a16="http://schemas.microsoft.com/office/drawing/2014/main" id="{6C7988C1-DCF0-4944-9BDF-B77B8823810C}"/>
+              </a:ext>
+            </a:extLst>
+          </p:cNvPr>
+          <p:cNvSpPr>
+            <a:spLocks noGrp="1"/>
+          </p:cNvSpPr>
+          <p:nvPr>
+            <p:ph sz="quarter" idx="12"/>
+          </p:nvPr>
+        </p:nvSpPr>
+        <p:spPr>
+          <a:xfrm>
+            <a:off x="468312" y="1700808"/>
+            <a:ext cx="8207373" cy="4914970"/>
+          </a:xfrm>
+        </p:spPr>
+        <p:txBody>
+          <a:bodyPr/>
+          <a:lstStyle/>
+          <a:p>
+            <a:pPr>
+              <a:lnSpc>
+                <a:spcPct val="150000"/>
+              </a:lnSpc>
+            </a:pPr>
+            <a:r>
+              <a:rPr lang="de-DE" sz="1800" b="1" dirty="0"/>
+              <a:t>Input: </a:t>
+            </a:r>
+            <a:r>
+              <a:rPr lang="de-DE" sz="1800" dirty="0" err="1"/>
+              <a:t>Numerical</a:t>
+            </a:r>
+            <a:r>
+              <a:rPr lang="de-DE" sz="1800" dirty="0"/>
+              <a:t> </a:t>
+            </a:r>
+            <a:r>
+              <a:rPr lang="de-DE" sz="1800" dirty="0" err="1"/>
+              <a:t>vectors</a:t>
+            </a:r>
+            <a:r>
+              <a:rPr lang="de-DE" sz="1800" dirty="0"/>
+              <a:t> </a:t>
+            </a:r>
+            <a:r>
+              <a:rPr lang="de-DE" sz="1800" dirty="0" err="1"/>
+              <a:t>or</a:t>
+            </a:r>
+            <a:r>
+              <a:rPr lang="de-DE" sz="1800" dirty="0"/>
+              <a:t> </a:t>
+            </a:r>
+            <a:r>
+              <a:rPr lang="de-DE" sz="1800" dirty="0" err="1"/>
+              <a:t>matrices</a:t>
+            </a:r>
+            <a:r>
+              <a:rPr lang="de-DE" sz="1800" dirty="0"/>
+              <a:t>  </a:t>
+            </a:r>
+          </a:p>
+          <a:p>
+            <a:pPr>
+              <a:lnSpc>
+                <a:spcPct val="100000"/>
+              </a:lnSpc>
+            </a:pPr>
+            <a:r>
+              <a:rPr lang="de-DE" sz="1800" b="1" dirty="0" err="1"/>
+              <a:t>Activation</a:t>
+            </a:r>
+            <a:r>
+              <a:rPr lang="de-DE" sz="1800" b="1" dirty="0"/>
+              <a:t>:</a:t>
+            </a:r>
+            <a:r>
+              <a:rPr lang="de-DE" sz="1800" dirty="0"/>
+              <a:t> Can </a:t>
+            </a:r>
+            <a:r>
+              <a:rPr lang="de-DE" sz="1800" dirty="0" err="1"/>
+              <a:t>be</a:t>
+            </a:r>
+            <a:r>
+              <a:rPr lang="de-DE" sz="1800" dirty="0"/>
+              <a:t> a </a:t>
+            </a:r>
+            <a:r>
+              <a:rPr lang="de-DE" sz="1800" dirty="0" err="1"/>
+              <a:t>threshold</a:t>
+            </a:r>
+            <a:r>
+              <a:rPr lang="de-DE" sz="1800" dirty="0"/>
+              <a:t> </a:t>
+            </a:r>
+            <a:r>
+              <a:rPr lang="de-DE" sz="1800" dirty="0" err="1"/>
+              <a:t>or</a:t>
+            </a:r>
+            <a:r>
+              <a:rPr lang="de-DE" sz="1800" dirty="0"/>
+              <a:t> </a:t>
+            </a:r>
+            <a:r>
+              <a:rPr lang="de-DE" sz="1800" dirty="0" err="1"/>
+              <a:t>other</a:t>
+            </a:r>
+            <a:r>
+              <a:rPr lang="de-DE" sz="1800" dirty="0"/>
+              <a:t> </a:t>
+            </a:r>
+            <a:r>
+              <a:rPr lang="de-DE" sz="1800" dirty="0" err="1"/>
+              <a:t>functions</a:t>
+            </a:r>
+            <a:r>
+              <a:rPr lang="de-DE" sz="1800" dirty="0"/>
+              <a:t> </a:t>
+            </a:r>
+            <a:r>
+              <a:rPr lang="de-DE" sz="1800" dirty="0" err="1"/>
+              <a:t>to</a:t>
+            </a:r>
+            <a:r>
+              <a:rPr lang="de-DE" sz="1800" dirty="0"/>
+              <a:t> </a:t>
+            </a:r>
+            <a:r>
+              <a:rPr lang="de-DE" sz="1800" dirty="0" err="1"/>
+              <a:t>determine</a:t>
+            </a:r>
+            <a:r>
+              <a:rPr lang="de-DE" sz="1800" dirty="0"/>
+              <a:t> </a:t>
+            </a:r>
+            <a:r>
+              <a:rPr lang="de-DE" sz="1800" dirty="0" err="1"/>
+              <a:t>if</a:t>
+            </a:r>
+            <a:r>
+              <a:rPr lang="de-DE" sz="1800" dirty="0"/>
+              <a:t> Neuron </a:t>
+            </a:r>
+            <a:r>
+              <a:rPr lang="de-DE" sz="1800" dirty="0" err="1"/>
+              <a:t>fires</a:t>
+            </a:r>
+            <a:r>
+              <a:rPr lang="de-DE" sz="1800" dirty="0"/>
+              <a:t> </a:t>
+            </a:r>
+            <a:r>
+              <a:rPr lang="de-DE" sz="1800" dirty="0" err="1"/>
+              <a:t>or</a:t>
+            </a:r>
+            <a:r>
+              <a:rPr lang="de-DE" sz="1800" dirty="0"/>
+              <a:t> not („0“ </a:t>
+            </a:r>
+            <a:r>
+              <a:rPr lang="de-DE" sz="1800" dirty="0" err="1"/>
+              <a:t>or</a:t>
+            </a:r>
+            <a:r>
+              <a:rPr lang="de-DE" sz="1800" dirty="0"/>
+              <a:t> „1“)</a:t>
+            </a:r>
+          </a:p>
+          <a:p>
+            <a:pPr>
+              <a:lnSpc>
+                <a:spcPct val="100000"/>
+              </a:lnSpc>
+            </a:pPr>
+            <a:r>
+              <a:rPr lang="de-DE" sz="1800" b="1" dirty="0"/>
+              <a:t>Learning rate:</a:t>
+            </a:r>
+            <a:r>
+              <a:rPr lang="de-DE" sz="1800" dirty="0"/>
+              <a:t> </a:t>
+            </a:r>
+            <a:r>
+              <a:rPr lang="de-DE" sz="1800" dirty="0" err="1"/>
+              <a:t>Determines</a:t>
+            </a:r>
+            <a:r>
+              <a:rPr lang="de-DE" sz="1800" dirty="0"/>
+              <a:t> </a:t>
+            </a:r>
+            <a:r>
+              <a:rPr lang="de-DE" sz="1800" dirty="0" err="1"/>
+              <a:t>how</a:t>
+            </a:r>
+            <a:r>
+              <a:rPr lang="de-DE" sz="1800" dirty="0"/>
+              <a:t> fast an </a:t>
+            </a:r>
+            <a:r>
+              <a:rPr lang="de-DE" sz="1800" dirty="0" err="1"/>
+              <a:t>algorithm</a:t>
+            </a:r>
+            <a:r>
+              <a:rPr lang="de-DE" sz="1800" dirty="0"/>
+              <a:t> </a:t>
+            </a:r>
+            <a:r>
+              <a:rPr lang="de-DE" sz="1800" dirty="0" err="1"/>
+              <a:t>should</a:t>
+            </a:r>
+            <a:r>
+              <a:rPr lang="de-DE" sz="1800" dirty="0"/>
+              <a:t> </a:t>
+            </a:r>
+            <a:r>
+              <a:rPr lang="de-DE" sz="1800" dirty="0" err="1"/>
+              <a:t>adjust</a:t>
+            </a:r>
+            <a:r>
+              <a:rPr lang="de-DE" sz="1800" dirty="0"/>
+              <a:t> </a:t>
+            </a:r>
+            <a:r>
+              <a:rPr lang="de-DE" sz="1800" dirty="0" err="1"/>
+              <a:t>to</a:t>
+            </a:r>
+            <a:r>
+              <a:rPr lang="de-DE" sz="1800" dirty="0"/>
+              <a:t> </a:t>
+            </a:r>
+            <a:r>
+              <a:rPr lang="de-DE" sz="1800" dirty="0" err="1"/>
+              <a:t>new</a:t>
+            </a:r>
+            <a:r>
+              <a:rPr lang="de-DE" sz="1800" dirty="0"/>
+              <a:t> </a:t>
+            </a:r>
+            <a:r>
+              <a:rPr lang="de-DE" sz="1800" dirty="0" err="1"/>
+              <a:t>data</a:t>
+            </a:r>
+            <a:r>
+              <a:rPr lang="de-DE" sz="1800" dirty="0"/>
+              <a:t>. A high </a:t>
+            </a:r>
+            <a:r>
+              <a:rPr lang="de-DE" sz="1800" dirty="0" err="1"/>
+              <a:t>learning</a:t>
+            </a:r>
+            <a:r>
+              <a:rPr lang="de-DE" sz="1800" dirty="0"/>
+              <a:t> rate </a:t>
+            </a:r>
+            <a:r>
+              <a:rPr lang="de-DE" sz="1800" dirty="0" err="1"/>
+              <a:t>adjusts</a:t>
+            </a:r>
+            <a:r>
+              <a:rPr lang="de-DE" sz="1800" dirty="0"/>
+              <a:t> </a:t>
+            </a:r>
+            <a:r>
+              <a:rPr lang="de-DE" sz="1800" dirty="0" err="1"/>
+              <a:t>better</a:t>
+            </a:r>
+            <a:r>
+              <a:rPr lang="de-DE" sz="1800" dirty="0"/>
+              <a:t> and </a:t>
+            </a:r>
+            <a:r>
+              <a:rPr lang="de-DE" sz="1800" dirty="0" err="1"/>
+              <a:t>faster</a:t>
+            </a:r>
+            <a:r>
+              <a:rPr lang="de-DE" sz="1800" dirty="0"/>
+              <a:t> </a:t>
+            </a:r>
+            <a:r>
+              <a:rPr lang="de-DE" sz="1800" dirty="0" err="1"/>
+              <a:t>to</a:t>
+            </a:r>
+            <a:r>
+              <a:rPr lang="de-DE" sz="1800" dirty="0"/>
+              <a:t> </a:t>
+            </a:r>
+            <a:r>
+              <a:rPr lang="de-DE" sz="1800" dirty="0" err="1"/>
+              <a:t>new</a:t>
+            </a:r>
+            <a:r>
+              <a:rPr lang="de-DE" sz="1800" dirty="0"/>
+              <a:t> </a:t>
+            </a:r>
+            <a:r>
+              <a:rPr lang="de-DE" sz="1800" dirty="0" err="1"/>
+              <a:t>data</a:t>
+            </a:r>
+            <a:r>
+              <a:rPr lang="de-DE" sz="1800" dirty="0"/>
+              <a:t> but also </a:t>
+            </a:r>
+            <a:r>
+              <a:rPr lang="de-DE" sz="1800" dirty="0" err="1"/>
+              <a:t>discards</a:t>
+            </a:r>
+            <a:r>
+              <a:rPr lang="de-DE" sz="1800" dirty="0"/>
+              <a:t> </a:t>
+            </a:r>
+            <a:r>
+              <a:rPr lang="de-DE" sz="1800" dirty="0" err="1"/>
+              <a:t>learned</a:t>
+            </a:r>
+            <a:r>
+              <a:rPr lang="de-DE" sz="1800" dirty="0"/>
+              <a:t> </a:t>
+            </a:r>
+            <a:r>
+              <a:rPr lang="de-DE" sz="1800" dirty="0" err="1"/>
+              <a:t>circumstances</a:t>
+            </a:r>
+            <a:endParaRPr lang="de-DE" sz="1800" dirty="0"/>
+          </a:p>
+          <a:p>
+            <a:pPr>
+              <a:lnSpc>
+                <a:spcPct val="150000"/>
+              </a:lnSpc>
+            </a:pPr>
+            <a:r>
+              <a:rPr lang="de-DE" sz="1800" b="1" dirty="0"/>
+              <a:t>Optimizer:</a:t>
+            </a:r>
+            <a:r>
+              <a:rPr lang="de-DE" sz="1800" dirty="0"/>
+              <a:t> </a:t>
+            </a:r>
+            <a:r>
+              <a:rPr lang="de-DE" sz="1800" dirty="0" err="1"/>
+              <a:t>Function</a:t>
+            </a:r>
+            <a:r>
+              <a:rPr lang="de-DE" sz="1800" dirty="0"/>
+              <a:t> </a:t>
+            </a:r>
+            <a:r>
+              <a:rPr lang="de-DE" sz="1800" dirty="0" err="1"/>
+              <a:t>to</a:t>
+            </a:r>
+            <a:r>
+              <a:rPr lang="de-DE" sz="1800" dirty="0"/>
+              <a:t> </a:t>
+            </a:r>
+            <a:r>
+              <a:rPr lang="de-DE" sz="1800" dirty="0" err="1"/>
+              <a:t>optimize</a:t>
+            </a:r>
+            <a:r>
+              <a:rPr lang="de-DE" sz="1800" dirty="0"/>
+              <a:t> </a:t>
+            </a:r>
+            <a:r>
+              <a:rPr lang="de-DE" sz="1800" dirty="0" err="1"/>
+              <a:t>model</a:t>
+            </a:r>
+            <a:r>
+              <a:rPr lang="de-DE" sz="1800" dirty="0"/>
+              <a:t> (i.e. </a:t>
+            </a:r>
+            <a:r>
+              <a:rPr lang="de-DE" sz="1800" dirty="0" err="1"/>
+              <a:t>weights</a:t>
+            </a:r>
+            <a:r>
+              <a:rPr lang="de-DE" sz="1800" dirty="0"/>
+              <a:t>)</a:t>
+            </a:r>
+          </a:p>
+          <a:p>
+            <a:pPr>
+              <a:lnSpc>
+                <a:spcPct val="100000"/>
+              </a:lnSpc>
+            </a:pPr>
+            <a:r>
+              <a:rPr lang="de-DE" sz="1800" b="1" dirty="0" err="1"/>
+              <a:t>Epochs</a:t>
+            </a:r>
+            <a:r>
+              <a:rPr lang="de-DE" sz="1800" b="1" dirty="0"/>
+              <a:t>:</a:t>
+            </a:r>
+            <a:r>
+              <a:rPr lang="de-DE" sz="1800" dirty="0"/>
+              <a:t> An </a:t>
+            </a:r>
+            <a:r>
+              <a:rPr lang="de-DE" sz="1800" dirty="0" err="1"/>
+              <a:t>epoch</a:t>
+            </a:r>
+            <a:r>
+              <a:rPr lang="de-DE" sz="1800" dirty="0"/>
+              <a:t> </a:t>
+            </a:r>
+            <a:r>
+              <a:rPr lang="de-DE" sz="1800" dirty="0" err="1"/>
+              <a:t>is</a:t>
+            </a:r>
+            <a:r>
+              <a:rPr lang="de-DE" sz="1800" dirty="0"/>
+              <a:t> a </a:t>
+            </a:r>
+            <a:r>
+              <a:rPr lang="de-DE" sz="1800" dirty="0" err="1"/>
+              <a:t>whole</a:t>
+            </a:r>
+            <a:r>
+              <a:rPr lang="de-DE" sz="1800" dirty="0"/>
+              <a:t> </a:t>
+            </a:r>
+            <a:r>
+              <a:rPr lang="de-DE" sz="1800" dirty="0" err="1"/>
+              <a:t>iteration</a:t>
+            </a:r>
+            <a:r>
+              <a:rPr lang="de-DE" sz="1800" dirty="0"/>
+              <a:t> </a:t>
+            </a:r>
+            <a:r>
+              <a:rPr lang="de-DE" sz="1800" dirty="0" err="1"/>
+              <a:t>of</a:t>
+            </a:r>
+            <a:r>
+              <a:rPr lang="de-DE" sz="1800" dirty="0"/>
+              <a:t> </a:t>
+            </a:r>
+            <a:r>
+              <a:rPr lang="de-DE" sz="1800" dirty="0" err="1"/>
+              <a:t>than</a:t>
+            </a:r>
+            <a:r>
+              <a:rPr lang="de-DE" sz="1800" dirty="0"/>
+              <a:t> </a:t>
+            </a:r>
+            <a:r>
+              <a:rPr lang="de-DE" sz="1800" dirty="0" err="1"/>
+              <a:t>one</a:t>
+            </a:r>
+            <a:r>
+              <a:rPr lang="de-DE" sz="1800" dirty="0"/>
+              <a:t> </a:t>
+            </a:r>
+            <a:r>
+              <a:rPr lang="de-DE" sz="1800" dirty="0" err="1"/>
+              <a:t>iteration</a:t>
+            </a:r>
+            <a:r>
+              <a:rPr lang="de-DE" sz="1800" dirty="0"/>
+              <a:t> </a:t>
+            </a:r>
+            <a:r>
+              <a:rPr lang="de-DE" sz="1800" dirty="0" err="1"/>
+              <a:t>of</a:t>
+            </a:r>
+            <a:r>
+              <a:rPr lang="de-DE" sz="1800" dirty="0"/>
+              <a:t> all </a:t>
+            </a:r>
+            <a:r>
+              <a:rPr lang="de-DE" sz="1800" dirty="0" err="1"/>
+              <a:t>data</a:t>
+            </a:r>
+            <a:r>
+              <a:rPr lang="de-DE" sz="1800" dirty="0"/>
+              <a:t> </a:t>
+            </a:r>
+            <a:r>
+              <a:rPr lang="de-DE" sz="1800" dirty="0" err="1"/>
+              <a:t>to</a:t>
+            </a:r>
+            <a:r>
+              <a:rPr lang="de-DE" sz="1800" dirty="0"/>
+              <a:t> </a:t>
+            </a:r>
+            <a:r>
+              <a:rPr lang="de-DE" sz="1800" dirty="0" err="1"/>
+              <a:t>have</a:t>
+            </a:r>
+            <a:r>
+              <a:rPr lang="de-DE" sz="1800" dirty="0"/>
+              <a:t> an optimal </a:t>
+            </a:r>
+            <a:r>
+              <a:rPr lang="de-DE" sz="1800" dirty="0" err="1"/>
+              <a:t>model</a:t>
+            </a:r>
+            <a:r>
+              <a:rPr lang="de-DE" sz="1800" dirty="0"/>
+              <a:t> </a:t>
+            </a:r>
+            <a:r>
+              <a:rPr lang="de-DE" sz="1800" dirty="0" err="1"/>
+              <a:t>for</a:t>
+            </a:r>
+            <a:r>
+              <a:rPr lang="de-DE" sz="1800" dirty="0"/>
+              <a:t> </a:t>
+            </a:r>
+            <a:r>
+              <a:rPr lang="de-DE" sz="1800" dirty="0" err="1"/>
+              <a:t>the</a:t>
+            </a:r>
+            <a:r>
+              <a:rPr lang="de-DE" sz="1800" dirty="0"/>
+              <a:t> </a:t>
+            </a:r>
+            <a:r>
+              <a:rPr lang="de-DE" sz="1800" dirty="0" err="1"/>
+              <a:t>given</a:t>
+            </a:r>
+            <a:r>
+              <a:rPr lang="de-DE" sz="1800" dirty="0"/>
+              <a:t> </a:t>
+            </a:r>
+            <a:r>
+              <a:rPr lang="de-DE" sz="1800" dirty="0" err="1"/>
+              <a:t>problemall</a:t>
+            </a:r>
+            <a:r>
+              <a:rPr lang="de-DE" sz="1800" dirty="0"/>
+              <a:t> </a:t>
+            </a:r>
+            <a:r>
+              <a:rPr lang="de-DE" sz="1800" dirty="0" err="1"/>
+              <a:t>input</a:t>
+            </a:r>
+            <a:r>
+              <a:rPr lang="de-DE" sz="1800" dirty="0"/>
+              <a:t> </a:t>
+            </a:r>
+            <a:r>
+              <a:rPr lang="de-DE" sz="1800" dirty="0" err="1"/>
+              <a:t>data</a:t>
+            </a:r>
+            <a:r>
+              <a:rPr lang="de-DE" sz="1800" dirty="0"/>
+              <a:t>. </a:t>
+            </a:r>
+            <a:r>
+              <a:rPr lang="de-DE" sz="1800" dirty="0" err="1"/>
+              <a:t>Algorithms</a:t>
+            </a:r>
+            <a:r>
+              <a:rPr lang="de-DE" sz="1800" dirty="0"/>
+              <a:t> </a:t>
+            </a:r>
+            <a:r>
+              <a:rPr lang="de-DE" sz="1800" dirty="0" err="1"/>
+              <a:t>need</a:t>
+            </a:r>
+            <a:r>
+              <a:rPr lang="de-DE" sz="1800" dirty="0"/>
+              <a:t> </a:t>
+            </a:r>
+            <a:r>
+              <a:rPr lang="de-DE" sz="1800" dirty="0" err="1"/>
+              <a:t>more</a:t>
+            </a:r>
+            <a:endParaRPr lang="de-DE" sz="1800" dirty="0"/>
+          </a:p>
+          <a:p>
+            <a:pPr>
+              <a:lnSpc>
+                <a:spcPct val="100000"/>
+              </a:lnSpc>
+            </a:pPr>
+            <a:r>
+              <a:rPr lang="de-DE" sz="1800" b="1" dirty="0"/>
+              <a:t>Batches:</a:t>
+            </a:r>
+            <a:r>
+              <a:rPr lang="de-DE" sz="1800" dirty="0"/>
+              <a:t> </a:t>
+            </a:r>
+            <a:r>
+              <a:rPr lang="de-DE" sz="1800" dirty="0" err="1"/>
+              <a:t>Sometimes</a:t>
+            </a:r>
+            <a:r>
+              <a:rPr lang="de-DE" sz="1800" dirty="0"/>
+              <a:t> </a:t>
+            </a:r>
+            <a:r>
+              <a:rPr lang="de-DE" sz="1800" dirty="0" err="1"/>
+              <a:t>data</a:t>
+            </a:r>
+            <a:r>
+              <a:rPr lang="de-DE" sz="1800" dirty="0"/>
+              <a:t> </a:t>
+            </a:r>
+            <a:r>
+              <a:rPr lang="de-DE" sz="1800" dirty="0" err="1"/>
+              <a:t>is</a:t>
+            </a:r>
+            <a:r>
+              <a:rPr lang="de-DE" sz="1800" dirty="0"/>
+              <a:t> </a:t>
+            </a:r>
+            <a:r>
+              <a:rPr lang="de-DE" sz="1800" dirty="0" err="1"/>
+              <a:t>too</a:t>
+            </a:r>
+            <a:r>
+              <a:rPr lang="de-DE" sz="1800" dirty="0"/>
+              <a:t> </a:t>
+            </a:r>
+            <a:r>
+              <a:rPr lang="de-DE" sz="1800" dirty="0" err="1"/>
+              <a:t>big</a:t>
+            </a:r>
+            <a:r>
+              <a:rPr lang="de-DE" sz="1800" dirty="0"/>
+              <a:t> </a:t>
+            </a:r>
+            <a:r>
+              <a:rPr lang="de-DE" sz="1800" dirty="0" err="1"/>
+              <a:t>to</a:t>
+            </a:r>
+            <a:r>
+              <a:rPr lang="de-DE" sz="1800" dirty="0"/>
+              <a:t> </a:t>
+            </a:r>
+            <a:r>
+              <a:rPr lang="de-DE" sz="1800" dirty="0" err="1"/>
+              <a:t>put</a:t>
+            </a:r>
+            <a:r>
+              <a:rPr lang="de-DE" sz="1800" dirty="0"/>
+              <a:t> fully </a:t>
+            </a:r>
+            <a:r>
+              <a:rPr lang="de-DE" sz="1800" dirty="0" err="1"/>
+              <a:t>into</a:t>
+            </a:r>
+            <a:r>
+              <a:rPr lang="de-DE" sz="1800" dirty="0"/>
+              <a:t> RAM. </a:t>
+            </a:r>
+            <a:r>
+              <a:rPr lang="de-DE" sz="1800" dirty="0" err="1"/>
+              <a:t>Then</a:t>
+            </a:r>
+            <a:r>
+              <a:rPr lang="de-DE" sz="1800" dirty="0"/>
+              <a:t> </a:t>
+            </a:r>
+            <a:r>
+              <a:rPr lang="de-DE" sz="1800" dirty="0" err="1"/>
+              <a:t>it</a:t>
+            </a:r>
+            <a:r>
+              <a:rPr lang="de-DE" sz="1800" dirty="0"/>
+              <a:t> </a:t>
+            </a:r>
+            <a:r>
+              <a:rPr lang="de-DE" sz="1800" dirty="0" err="1"/>
+              <a:t>needs</a:t>
+            </a:r>
+            <a:r>
+              <a:rPr lang="de-DE" sz="1800" dirty="0"/>
+              <a:t> </a:t>
+            </a:r>
+            <a:r>
+              <a:rPr lang="de-DE" sz="1800" dirty="0" err="1"/>
+              <a:t>to</a:t>
+            </a:r>
+            <a:r>
+              <a:rPr lang="de-DE" sz="1800" dirty="0"/>
+              <a:t> </a:t>
+            </a:r>
+            <a:r>
+              <a:rPr lang="de-DE" sz="1800" dirty="0" err="1"/>
+              <a:t>be</a:t>
+            </a:r>
+            <a:r>
+              <a:rPr lang="de-DE" sz="1800" dirty="0"/>
+              <a:t> </a:t>
+            </a:r>
+            <a:r>
+              <a:rPr lang="de-DE" sz="1800" dirty="0" err="1"/>
+              <a:t>processed</a:t>
+            </a:r>
+            <a:r>
+              <a:rPr lang="de-DE" sz="1800" dirty="0"/>
+              <a:t> </a:t>
+            </a:r>
+            <a:r>
+              <a:rPr lang="de-DE" sz="1800" dirty="0" err="1"/>
+              <a:t>into</a:t>
+            </a:r>
+            <a:r>
+              <a:rPr lang="de-DE" sz="1800" dirty="0"/>
+              <a:t> </a:t>
+            </a:r>
+            <a:r>
+              <a:rPr lang="de-DE" sz="1800" dirty="0" err="1"/>
+              <a:t>slices</a:t>
+            </a:r>
+            <a:r>
+              <a:rPr lang="de-DE" sz="1800" dirty="0"/>
+              <a:t> (aka </a:t>
+            </a:r>
+            <a:r>
+              <a:rPr lang="de-DE" sz="1800" dirty="0" err="1"/>
+              <a:t>batches</a:t>
+            </a:r>
+            <a:r>
+              <a:rPr lang="de-DE" sz="1800" dirty="0"/>
+              <a:t>).</a:t>
+            </a:r>
+          </a:p>
+          <a:p>
+            <a:pPr>
+              <a:lnSpc>
+                <a:spcPct val="100000"/>
+              </a:lnSpc>
+            </a:pPr>
+            <a:r>
+              <a:rPr lang="de-DE" sz="1800" b="1" dirty="0" err="1"/>
+              <a:t>Regularization</a:t>
+            </a:r>
+            <a:r>
+              <a:rPr lang="de-DE" sz="1800" b="1" dirty="0"/>
+              <a:t>: </a:t>
+            </a:r>
+            <a:r>
+              <a:rPr lang="en-US" sz="1800" dirty="0"/>
+              <a:t>Goal is to use as less variables for a model as possible to prevent overfitting, e.g. by </a:t>
+            </a:r>
+            <a:r>
+              <a:rPr lang="de-DE" sz="1800" dirty="0" err="1"/>
+              <a:t>dropping</a:t>
+            </a:r>
+            <a:r>
+              <a:rPr lang="de-DE" sz="1800" dirty="0"/>
+              <a:t> out a </a:t>
+            </a:r>
+            <a:r>
+              <a:rPr lang="de-DE" sz="1800" dirty="0" err="1"/>
+              <a:t>fixed</a:t>
+            </a:r>
+            <a:r>
+              <a:rPr lang="de-DE" sz="1800" dirty="0"/>
+              <a:t> </a:t>
+            </a:r>
+            <a:r>
+              <a:rPr lang="de-DE" sz="1800" dirty="0" err="1"/>
+              <a:t>number</a:t>
+            </a:r>
+            <a:r>
+              <a:rPr lang="de-DE" sz="1800" dirty="0"/>
+              <a:t> </a:t>
+            </a:r>
+            <a:r>
+              <a:rPr lang="de-DE" sz="1800" dirty="0" err="1"/>
+              <a:t>of</a:t>
+            </a:r>
+            <a:r>
+              <a:rPr lang="de-DE" sz="1800" dirty="0"/>
+              <a:t> </a:t>
+            </a:r>
+            <a:r>
+              <a:rPr lang="de-DE" sz="1800" dirty="0" err="1"/>
+              <a:t>neurons</a:t>
+            </a:r>
+            <a:endParaRPr lang="de-DE" sz="1800" b="1" dirty="0"/>
+          </a:p>
+        </p:txBody>
+      </p:sp>
+    </p:spTree>
+    <p:extLst>
+      <p:ext uri="{BB962C8B-B14F-4D97-AF65-F5344CB8AC3E}">
+        <p14:creationId xmlns:p14="http://schemas.microsoft.com/office/powerpoint/2010/main" val="949343435"/>
+      </p:ext>
+    </p:extLst>
+  </p:cSld>
+  <p:clrMapOvr>
+    <a:masterClrMapping/>
+  </p:clrMapOvr>
+</p:sld>
+</file>
+
 <file path=ppt/slides/slide35.xml><?xml version="1.0" encoding="utf-8"?>
 <p:sld xmlns:a="http://schemas.openxmlformats.org/drawingml/2006/main" xmlns:r="http://schemas.openxmlformats.org/officeDocument/2006/relationships" xmlns:p="http://schemas.openxmlformats.org/presentationml/2006/main">
   <p:cSld>
@@ -24210,7 +24269,7 @@
         </p:nvSpPr>
         <p:spPr>
           <a:xfrm>
-            <a:off x="35168" y="4665554"/>
+            <a:off x="35168" y="4674346"/>
             <a:ext cx="8497272" cy="531318"/>
           </a:xfrm>
           <a:prstGeom prst="rect">
@@ -24821,7 +24880,7 @@
               </a:lnSpc>
             </a:pPr>
             <a:r>
-              <a:rPr lang="de-DE" sz="2400" b="1" spc="-1" dirty="0">
+              <a:rPr lang="de-DE" sz="2400" b="1" spc="-1" dirty="0" err="1">
                 <a:solidFill>
                   <a:srgbClr val="4F81BD"/>
                 </a:solidFill>
@@ -24832,7 +24891,161 @@
                 </a:uFill>
                 <a:latin typeface="Arial"/>
               </a:rPr>
-              <a:t>General</a:t>
+              <a:t>How</a:t>
+            </a:r>
+            <a:r>
+              <a:rPr lang="de-DE" sz="2400" b="1" spc="-1" dirty="0">
+                <a:solidFill>
+                  <a:srgbClr val="4F81BD"/>
+                </a:solidFill>
+                <a:uFill>
+                  <a:solidFill>
+                    <a:srgbClr val="FFFFFF"/>
+                  </a:solidFill>
+                </a:uFill>
+                <a:latin typeface="Arial"/>
+              </a:rPr>
+              <a:t> </a:t>
+            </a:r>
+            <a:r>
+              <a:rPr lang="de-DE" sz="2400" b="1" spc="-1" dirty="0" err="1">
+                <a:solidFill>
+                  <a:srgbClr val="4F81BD"/>
+                </a:solidFill>
+                <a:uFill>
+                  <a:solidFill>
+                    <a:srgbClr val="FFFFFF"/>
+                  </a:solidFill>
+                </a:uFill>
+                <a:latin typeface="Arial"/>
+              </a:rPr>
+              <a:t>to</a:t>
+            </a:r>
+            <a:r>
+              <a:rPr lang="de-DE" sz="2400" b="1" spc="-1" dirty="0">
+                <a:solidFill>
+                  <a:srgbClr val="4F81BD"/>
+                </a:solidFill>
+                <a:uFill>
+                  <a:solidFill>
+                    <a:srgbClr val="FFFFFF"/>
+                  </a:solidFill>
+                </a:uFill>
+                <a:latin typeface="Arial"/>
+              </a:rPr>
+              <a:t> </a:t>
+            </a:r>
+            <a:r>
+              <a:rPr lang="de-DE" sz="2400" b="1" spc="-1" dirty="0" err="1">
+                <a:solidFill>
+                  <a:srgbClr val="4F81BD"/>
+                </a:solidFill>
+                <a:uFill>
+                  <a:solidFill>
+                    <a:srgbClr val="FFFFFF"/>
+                  </a:solidFill>
+                </a:uFill>
+                <a:latin typeface="Arial"/>
+              </a:rPr>
+              <a:t>transform</a:t>
+            </a:r>
+            <a:r>
+              <a:rPr lang="de-DE" sz="2400" b="1" spc="-1" dirty="0">
+                <a:solidFill>
+                  <a:srgbClr val="4F81BD"/>
+                </a:solidFill>
+                <a:uFill>
+                  <a:solidFill>
+                    <a:srgbClr val="FFFFFF"/>
+                  </a:solidFill>
+                </a:uFill>
+                <a:latin typeface="Arial"/>
+              </a:rPr>
+              <a:t> a </a:t>
+            </a:r>
+            <a:r>
+              <a:rPr lang="de-DE" sz="2400" b="1" spc="-1" dirty="0" err="1">
+                <a:solidFill>
+                  <a:srgbClr val="4F81BD"/>
+                </a:solidFill>
+                <a:uFill>
+                  <a:solidFill>
+                    <a:srgbClr val="FFFFFF"/>
+                  </a:solidFill>
+                </a:uFill>
+                <a:latin typeface="Arial"/>
+              </a:rPr>
+              <a:t>text</a:t>
+            </a:r>
+            <a:r>
+              <a:rPr lang="de-DE" sz="2400" b="1" spc="-1" dirty="0">
+                <a:solidFill>
+                  <a:srgbClr val="4F81BD"/>
+                </a:solidFill>
+                <a:uFill>
+                  <a:solidFill>
+                    <a:srgbClr val="FFFFFF"/>
+                  </a:solidFill>
+                </a:uFill>
+                <a:latin typeface="Arial"/>
+              </a:rPr>
+              <a:t> </a:t>
+            </a:r>
+            <a:r>
+              <a:rPr lang="de-DE" sz="2400" b="1" spc="-1" dirty="0" err="1">
+                <a:solidFill>
+                  <a:srgbClr val="4F81BD"/>
+                </a:solidFill>
+                <a:uFill>
+                  <a:solidFill>
+                    <a:srgbClr val="FFFFFF"/>
+                  </a:solidFill>
+                </a:uFill>
+                <a:latin typeface="Arial"/>
+              </a:rPr>
+              <a:t>into</a:t>
+            </a:r>
+            <a:r>
+              <a:rPr lang="de-DE" sz="2400" b="1" spc="-1" dirty="0">
+                <a:solidFill>
+                  <a:srgbClr val="4F81BD"/>
+                </a:solidFill>
+                <a:uFill>
+                  <a:solidFill>
+                    <a:srgbClr val="FFFFFF"/>
+                  </a:solidFill>
+                </a:uFill>
+                <a:latin typeface="Arial"/>
+              </a:rPr>
+              <a:t> a </a:t>
+            </a:r>
+            <a:r>
+              <a:rPr lang="de-DE" sz="2400" b="1" spc="-1" dirty="0" err="1">
+                <a:solidFill>
+                  <a:srgbClr val="4F81BD"/>
+                </a:solidFill>
+                <a:uFill>
+                  <a:solidFill>
+                    <a:srgbClr val="FFFFFF"/>
+                  </a:solidFill>
+                </a:uFill>
+                <a:latin typeface="Arial"/>
+              </a:rPr>
+              <a:t>model</a:t>
+            </a:r>
+            <a:r>
+              <a:rPr lang="de-DE" sz="2400" b="1" spc="-1" dirty="0">
+                <a:solidFill>
+                  <a:srgbClr val="4F81BD"/>
+                </a:solidFill>
+                <a:uFill>
+                  <a:solidFill>
+                    <a:srgbClr val="FFFFFF"/>
+                  </a:solidFill>
+                </a:uFill>
+                <a:latin typeface="Arial"/>
+              </a:rPr>
+              <a:t>?</a:t>
             </a:r>
             <a:endParaRPr lang="de-DE" sz="3200" b="0" strike="noStrike" spc="-1" dirty="0">
               <a:solidFill>
@@ -24999,16 +25212,82 @@
               <a:buFont typeface="Arial"/>
               <a:buChar char="&gt;"/>
             </a:pPr>
-            <a:endParaRPr lang="en-US" sz="2400" spc="-1" dirty="0">
-              <a:solidFill>
-                <a:srgbClr val="000000"/>
-              </a:solidFill>
-              <a:uFill>
-                <a:solidFill>
-                  <a:srgbClr val="FFFFFF"/>
-                </a:solidFill>
-              </a:uFill>
-            </a:endParaRPr>
+            <a:r>
+              <a:rPr lang="en-US" sz="2400" spc="-1" dirty="0">
+                <a:solidFill>
+                  <a:srgbClr val="000000"/>
+                </a:solidFill>
+                <a:uFill>
+                  <a:solidFill>
+                    <a:srgbClr val="FFFFFF"/>
+                  </a:solidFill>
+                </a:uFill>
+              </a:rPr>
+              <a:t>Neural Networks need numerical vectors to compute output</a:t>
+            </a:r>
+          </a:p>
+          <a:p>
+            <a:pPr marL="343080" indent="-342720">
+              <a:lnSpc>
+                <a:spcPct val="150000"/>
+              </a:lnSpc>
+              <a:buClr>
+                <a:srgbClr val="8064A2"/>
+              </a:buClr>
+              <a:buFont typeface="Arial"/>
+              <a:buChar char="&gt;"/>
+            </a:pPr>
+            <a:r>
+              <a:rPr lang="en-US" sz="2400" spc="-1" dirty="0">
+                <a:solidFill>
+                  <a:srgbClr val="000000"/>
+                </a:solidFill>
+                <a:uFill>
+                  <a:solidFill>
+                    <a:srgbClr val="FFFFFF"/>
+                  </a:solidFill>
+                </a:uFill>
+              </a:rPr>
+              <a:t>Transformation from text to model is done via </a:t>
+            </a:r>
+            <a:r>
+              <a:rPr lang="en-US" sz="2400" b="1" spc="-1" dirty="0">
+                <a:solidFill>
+                  <a:srgbClr val="000000"/>
+                </a:solidFill>
+                <a:uFill>
+                  <a:solidFill>
+                    <a:srgbClr val="FFFFFF"/>
+                  </a:solidFill>
+                </a:uFill>
+              </a:rPr>
+              <a:t>word embeddings</a:t>
+            </a:r>
+          </a:p>
+          <a:p>
+            <a:pPr marL="343080" indent="-342720">
+              <a:lnSpc>
+                <a:spcPct val="150000"/>
+              </a:lnSpc>
+              <a:buClr>
+                <a:srgbClr val="8064A2"/>
+              </a:buClr>
+              <a:buFont typeface="Arial"/>
+              <a:buChar char="&gt;"/>
+            </a:pPr>
+            <a:r>
+              <a:rPr lang="en-US" sz="2400" spc="-1" dirty="0">
+                <a:solidFill>
+                  <a:srgbClr val="000000"/>
+                </a:solidFill>
+                <a:uFill>
+                  <a:solidFill>
+                    <a:srgbClr val="FFFFFF"/>
+                  </a:solidFill>
+                </a:uFill>
+              </a:rPr>
+              <a:t>There are plenty algorithms for generating word embeddings </a:t>
+            </a:r>
           </a:p>
         </p:txBody>
       </p:sp>
@@ -25071,6 +25350,76 @@
       </p:grpSpPr>
       <p:sp>
         <p:nvSpPr>
+          <p:cNvPr id="192" name="TextShape 1"/>
+          <p:cNvSpPr txBox="1"/>
+          <p:nvPr/>
+        </p:nvSpPr>
+        <p:spPr>
+          <a:xfrm>
+            <a:off x="468360" y="1221480"/>
+            <a:ext cx="8206920" cy="356760"/>
+          </a:xfrm>
+          <a:prstGeom prst="rect">
+            <a:avLst/>
+          </a:prstGeom>
+          <a:noFill/>
+          <a:ln>
+            <a:noFill/>
+          </a:ln>
+        </p:spPr>
+        <p:txBody>
+          <a:bodyPr lIns="0" tIns="0" rIns="0" bIns="0" anchor="ctr"/>
+          <a:lstStyle/>
+          <a:p>
+            <a:pPr marL="343080" indent="-342720">
+              <a:lnSpc>
+                <a:spcPct val="100000"/>
+              </a:lnSpc>
+            </a:pPr>
+            <a:r>
+              <a:rPr lang="de-DE" sz="2400" b="1" spc="-1" dirty="0">
+                <a:solidFill>
+                  <a:srgbClr val="4F81BD"/>
+                </a:solidFill>
+                <a:uFill>
+                  <a:solidFill>
+                    <a:srgbClr val="FFFFFF"/>
+                  </a:solidFill>
+                </a:uFill>
+                <a:latin typeface="Arial"/>
+              </a:rPr>
+              <a:t>Word </a:t>
+            </a:r>
+            <a:r>
+              <a:rPr lang="de-DE" sz="2400" b="1" spc="-1" dirty="0" err="1">
+                <a:solidFill>
+                  <a:srgbClr val="4F81BD"/>
+                </a:solidFill>
+                <a:uFill>
+                  <a:solidFill>
+                    <a:srgbClr val="FFFFFF"/>
+                  </a:solidFill>
+                </a:uFill>
+                <a:latin typeface="Arial"/>
+              </a:rPr>
+              <a:t>embedding</a:t>
+            </a:r>
+            <a:endParaRPr lang="de-DE" sz="3200" b="0" strike="noStrike" spc="-1" dirty="0">
+              <a:solidFill>
+                <a:srgbClr val="000000"/>
+              </a:solidFill>
+              <a:uFill>
+                <a:solidFill>
+                  <a:srgbClr val="FFFFFF"/>
+                </a:solidFill>
+              </a:uFill>
+              <a:latin typeface="Arial"/>
+            </a:endParaRPr>
+          </a:p>
+        </p:txBody>
+      </p:sp>
+      <p:sp>
+        <p:nvSpPr>
           <p:cNvPr id="193" name="TextShape 2"/>
           <p:cNvSpPr txBox="1"/>
           <p:nvPr/>
@@ -25165,7 +25514,7 @@
                 </a:uFill>
                 <a:latin typeface="Arial"/>
               </a:rPr>
-              <a:t> Network</a:t>
+              <a:t> Networks </a:t>
             </a:r>
             <a:endParaRPr lang="de-DE" sz="3200" b="0" strike="noStrike" spc="-1" dirty="0">
               <a:solidFill>
@@ -25195,7 +25544,7 @@
         </p:nvSpPr>
         <p:spPr>
           <a:xfrm>
-            <a:off x="468360" y="1989000"/>
+            <a:off x="468360" y="1988840"/>
             <a:ext cx="8206920" cy="4247640"/>
           </a:xfrm>
           <a:prstGeom prst="rect">
@@ -25210,9 +25559,58 @@
           <a:bodyPr lIns="0" tIns="0" rIns="0" bIns="0"/>
           <a:lstStyle/>
           <a:p>
+            <a:pPr marL="360">
+              <a:lnSpc>
+                <a:spcPct val="150000"/>
+              </a:lnSpc>
+              <a:buClr>
+                <a:srgbClr val="8064A2"/>
+              </a:buClr>
+            </a:pPr>
+            <a:r>
+              <a:rPr lang="en-US" sz="2400" spc="-1" dirty="0">
+                <a:solidFill>
+                  <a:srgbClr val="000000"/>
+                </a:solidFill>
+                <a:uFill>
+                  <a:solidFill>
+                    <a:srgbClr val="FFFFFF"/>
+                  </a:solidFill>
+                </a:uFill>
+              </a:rPr>
+              <a:t>Simplest word embedding is </a:t>
+            </a:r>
+            <a:r>
+              <a:rPr lang="en-US" sz="2400" b="1" spc="-1" dirty="0">
+                <a:solidFill>
+                  <a:srgbClr val="000000"/>
+                </a:solidFill>
+                <a:uFill>
+                  <a:solidFill>
+                    <a:srgbClr val="FFFFFF"/>
+                  </a:solidFill>
+                </a:uFill>
+              </a:rPr>
+              <a:t>Bag of Words</a:t>
+            </a:r>
+            <a:r>
+              <a:rPr lang="en-US" sz="2400" spc="-1" dirty="0">
+                <a:solidFill>
+                  <a:srgbClr val="000000"/>
+                </a:solidFill>
+                <a:uFill>
+                  <a:solidFill>
+                    <a:srgbClr val="FFFFFF"/>
+                  </a:solidFill>
+                </a:uFill>
+              </a:rPr>
+              <a:t>:</a:t>
+            </a:r>
+          </a:p>
+          <a:p>
             <a:pPr marL="343080" indent="-342720">
               <a:lnSpc>
-                <a:spcPct val="200000"/>
+                <a:spcPct val="150000"/>
               </a:lnSpc>
               <a:buClr>
                 <a:srgbClr val="8064A2"/>
@@ -25220,21 +25618,37 @@
               <a:buFont typeface="Arial"/>
               <a:buChar char="&gt;"/>
             </a:pPr>
-            <a:endParaRPr lang="en-US" sz="2400" spc="-1" dirty="0">
-              <a:solidFill>
-                <a:srgbClr val="000000"/>
-              </a:solidFill>
-              <a:uFill>
-                <a:solidFill>
-                  <a:srgbClr val="FFFFFF"/>
-                </a:solidFill>
-              </a:uFill>
-            </a:endParaRPr>
+            <a:r>
+              <a:rPr lang="en-US" sz="2400" i="1" spc="-1" dirty="0">
+                <a:solidFill>
+                  <a:srgbClr val="000000"/>
+                </a:solidFill>
+                <a:uFill>
+                  <a:solidFill>
+                    <a:srgbClr val="FFFFFF"/>
+                  </a:solidFill>
+                </a:uFill>
+              </a:rPr>
+              <a:t>Input</a:t>
+            </a:r>
+            <a:r>
+              <a:rPr lang="en-US" sz="2400" spc="-1" dirty="0">
+                <a:solidFill>
+                  <a:srgbClr val="000000"/>
+                </a:solidFill>
+                <a:uFill>
+                  <a:solidFill>
+                    <a:srgbClr val="FFFFFF"/>
+                  </a:solidFill>
+                </a:uFill>
+              </a:rPr>
+              <a:t>: “My dog has a dog name”, “My dog is cute”</a:t>
+            </a:r>
           </a:p>
           <a:p>
             <a:pPr marL="343080" indent="-342720">
               <a:lnSpc>
-                <a:spcPct val="200000"/>
+                <a:spcPct val="150000"/>
               </a:lnSpc>
               <a:buClr>
                 <a:srgbClr val="8064A2"/>
@@ -25242,28 +25656,44 @@
               <a:buFont typeface="Arial"/>
               <a:buChar char="&gt;"/>
             </a:pPr>
-            <a:endParaRPr lang="en-US" sz="2400" spc="-1" dirty="0">
-              <a:solidFill>
-                <a:srgbClr val="000000"/>
-              </a:solidFill>
-              <a:uFill>
-                <a:solidFill>
-                  <a:srgbClr val="FFFFFF"/>
-                </a:solidFill>
-              </a:uFill>
-            </a:endParaRPr>
+            <a:r>
+              <a:rPr lang="en-US" sz="2400" i="1" spc="-1" dirty="0">
+                <a:solidFill>
+                  <a:srgbClr val="000000"/>
+                </a:solidFill>
+                <a:uFill>
+                  <a:solidFill>
+                    <a:srgbClr val="FFFFFF"/>
+                  </a:solidFill>
+                </a:uFill>
+              </a:rPr>
+              <a:t>Bag of Words</a:t>
+            </a:r>
+            <a:r>
+              <a:rPr lang="en-US" sz="2400" spc="-1" dirty="0">
+                <a:solidFill>
+                  <a:srgbClr val="000000"/>
+                </a:solidFill>
+                <a:uFill>
+                  <a:solidFill>
+                    <a:srgbClr val="FFFFFF"/>
+                  </a:solidFill>
+                </a:uFill>
+              </a:rPr>
+              <a:t>: </a:t>
+            </a:r>
           </a:p>
           <a:p>
             <a:pPr marL="360" algn="ctr">
               <a:lnSpc>
-                <a:spcPct val="200000"/>
+                <a:spcPct val="150000"/>
               </a:lnSpc>
               <a:buClr>
                 <a:srgbClr val="8064A2"/>
               </a:buClr>
             </a:pPr>
             <a:r>
-              <a:rPr lang="en-US" sz="2400" b="1" spc="-1" dirty="0">
+              <a:rPr lang="en-US" sz="2000" spc="-1" dirty="0">
                 <a:solidFill>
                   <a:srgbClr val="000000"/>
                 </a:solidFill>
@@ -25273,21 +25703,104 @@
                   </a:solidFill>
                 </a:uFill>
               </a:rPr>
-              <a:t>Let’s get our hands dirty!</a:t>
-            </a:r>
-          </a:p>
-          <a:p>
-            <a:pPr marL="343080" indent="-342720">
+              <a:t>Sent1: { “My” : 1, “dog” : 2, “has” : 1, “a” : 1, “name” : 1, “is” : 0, “cute” : 0 }</a:t>
+            </a:r>
+          </a:p>
+          <a:p>
+            <a:pPr marL="360" algn="ctr">
               <a:lnSpc>
-                <a:spcPct val="250000"/>
+                <a:spcPct val="150000"/>
               </a:lnSpc>
               <a:buClr>
                 <a:srgbClr val="8064A2"/>
               </a:buClr>
-              <a:buFont typeface="Arial"/>
-              <a:buChar char="&gt;"/>
             </a:pPr>
-            <a:endParaRPr lang="en-US" sz="2400" spc="-1" dirty="0">
+            <a:r>
+              <a:rPr lang="en-US" sz="2000" spc="-1" dirty="0">
+                <a:solidFill>
+                  <a:srgbClr val="000000"/>
+                </a:solidFill>
+                <a:uFill>
+                  <a:solidFill>
+                    <a:srgbClr val="FFFFFF"/>
+                  </a:solidFill>
+                </a:uFill>
+              </a:rPr>
+              <a:t>Sent2: { “My” : 1, “dog” : 1, “has” : 0, “a” : 0, “name” : 0, “is” : 1, “cute” : 1 }</a:t>
+            </a:r>
+          </a:p>
+          <a:p>
+            <a:pPr marL="360">
+              <a:lnSpc>
+                <a:spcPct val="150000"/>
+              </a:lnSpc>
+              <a:buClr>
+                <a:srgbClr val="8064A2"/>
+              </a:buClr>
+            </a:pPr>
+            <a:r>
+              <a:rPr lang="en-US" sz="2000" spc="-1" dirty="0">
+                <a:solidFill>
+                  <a:srgbClr val="000000"/>
+                </a:solidFill>
+                <a:uFill>
+                  <a:solidFill>
+                    <a:srgbClr val="FFFFFF"/>
+                  </a:solidFill>
+                </a:uFill>
+                <a:sym typeface="Wingdings" panose="05000000000000000000" pitchFamily="2" charset="2"/>
+              </a:rPr>
+              <a:t></a:t>
+            </a:r>
+          </a:p>
+          <a:p>
+            <a:pPr marL="360">
+              <a:lnSpc>
+                <a:spcPct val="150000"/>
+              </a:lnSpc>
+              <a:buClr>
+                <a:srgbClr val="8064A2"/>
+              </a:buClr>
+            </a:pPr>
+            <a:r>
+              <a:rPr lang="en-US" sz="2000" spc="-1" dirty="0">
+                <a:solidFill>
+                  <a:srgbClr val="000000"/>
+                </a:solidFill>
+                <a:uFill>
+                  <a:solidFill>
+                    <a:srgbClr val="FFFFFF"/>
+                  </a:solidFill>
+                </a:uFill>
+                <a:sym typeface="Wingdings" panose="05000000000000000000" pitchFamily="2" charset="2"/>
+              </a:rPr>
+              <a:t>Sent1: { 1, 2, 1, 1, 1, 0, 0 }</a:t>
+            </a:r>
+          </a:p>
+          <a:p>
+            <a:pPr marL="360">
+              <a:lnSpc>
+                <a:spcPct val="150000"/>
+              </a:lnSpc>
+              <a:buClr>
+                <a:srgbClr val="8064A2"/>
+              </a:buClr>
+            </a:pPr>
+            <a:r>
+              <a:rPr lang="en-US" sz="2000" spc="-1" dirty="0">
+                <a:solidFill>
+                  <a:srgbClr val="000000"/>
+                </a:solidFill>
+                <a:uFill>
+                  <a:solidFill>
+                    <a:srgbClr val="FFFFFF"/>
+                  </a:solidFill>
+                </a:uFill>
+                <a:sym typeface="Wingdings" panose="05000000000000000000" pitchFamily="2" charset="2"/>
+              </a:rPr>
+              <a:t>Sent1: { 1, 1, 0, 0, 0, 1, 0 }</a:t>
+            </a:r>
+            <a:endParaRPr lang="en-US" sz="2000" spc="-1" dirty="0">
               <a:solidFill>
                 <a:srgbClr val="000000"/>
               </a:solidFill>
@@ -25303,7 +25816,7 @@
     </p:spTree>
     <p:extLst>
       <p:ext uri="{BB962C8B-B14F-4D97-AF65-F5344CB8AC3E}">
-        <p14:creationId xmlns:p14="http://schemas.microsoft.com/office/powerpoint/2010/main" val="2843779514"/>
+        <p14:creationId xmlns:p14="http://schemas.microsoft.com/office/powerpoint/2010/main" val="3795041156"/>
       </p:ext>
     </p:extLst>
   </p:cSld>
@@ -25359,132 +25872,6 @@
       </p:grpSpPr>
       <p:sp>
         <p:nvSpPr>
-          <p:cNvPr id="192" name="TextShape 1"/>
-          <p:cNvSpPr txBox="1"/>
-          <p:nvPr/>
-        </p:nvSpPr>
-        <p:spPr>
-          <a:xfrm>
-            <a:off x="179512" y="3645024"/>
-            <a:ext cx="8206920" cy="356760"/>
-          </a:xfrm>
-          <a:prstGeom prst="rect">
-            <a:avLst/>
-          </a:prstGeom>
-          <a:noFill/>
-          <a:ln>
-            <a:noFill/>
-          </a:ln>
-        </p:spPr>
-        <p:txBody>
-          <a:bodyPr lIns="0" tIns="0" rIns="0" bIns="0" anchor="ctr"/>
-          <a:lstStyle/>
-          <a:p>
-            <a:pPr marL="343080" indent="-342720" algn="ctr">
-              <a:lnSpc>
-                <a:spcPct val="100000"/>
-              </a:lnSpc>
-            </a:pPr>
-            <a:r>
-              <a:rPr lang="de-DE" sz="2400" b="1" spc="-1" dirty="0" err="1">
-                <a:solidFill>
-                  <a:srgbClr val="4F81BD"/>
-                </a:solidFill>
-                <a:uFill>
-                  <a:solidFill>
-                    <a:srgbClr val="FFFFFF"/>
-                  </a:solidFill>
-                </a:uFill>
-                <a:latin typeface="Arial"/>
-              </a:rPr>
-              <a:t>What</a:t>
-            </a:r>
-            <a:r>
-              <a:rPr lang="de-DE" sz="2400" b="1" spc="-1" dirty="0">
-                <a:solidFill>
-                  <a:srgbClr val="4F81BD"/>
-                </a:solidFill>
-                <a:uFill>
-                  <a:solidFill>
-                    <a:srgbClr val="FFFFFF"/>
-                  </a:solidFill>
-                </a:uFill>
-                <a:latin typeface="Arial"/>
-              </a:rPr>
-              <a:t> do </a:t>
-            </a:r>
-            <a:r>
-              <a:rPr lang="de-DE" sz="2400" b="1" spc="-1" dirty="0" err="1">
-                <a:solidFill>
-                  <a:srgbClr val="4F81BD"/>
-                </a:solidFill>
-                <a:uFill>
-                  <a:solidFill>
-                    <a:srgbClr val="FFFFFF"/>
-                  </a:solidFill>
-                </a:uFill>
-                <a:latin typeface="Arial"/>
-              </a:rPr>
-              <a:t>you</a:t>
-            </a:r>
-            <a:r>
-              <a:rPr lang="de-DE" sz="2400" b="1" spc="-1" dirty="0">
-                <a:solidFill>
-                  <a:srgbClr val="4F81BD"/>
-                </a:solidFill>
-                <a:uFill>
-                  <a:solidFill>
-                    <a:srgbClr val="FFFFFF"/>
-                  </a:solidFill>
-                </a:uFill>
-                <a:latin typeface="Arial"/>
-              </a:rPr>
-              <a:t> </a:t>
-            </a:r>
-            <a:r>
-              <a:rPr lang="de-DE" sz="2400" b="1" spc="-1" dirty="0" err="1">
-                <a:solidFill>
-                  <a:srgbClr val="4F81BD"/>
-                </a:solidFill>
-                <a:uFill>
-                  <a:solidFill>
-                    <a:srgbClr val="FFFFFF"/>
-                  </a:solidFill>
-                </a:uFill>
-                <a:latin typeface="Arial"/>
-              </a:rPr>
-              <a:t>expect</a:t>
-            </a:r>
-            <a:r>
-              <a:rPr lang="de-DE" sz="2400" b="1" spc="-1" dirty="0">
-                <a:solidFill>
-                  <a:srgbClr val="4F81BD"/>
-                </a:solidFill>
-                <a:uFill>
-                  <a:solidFill>
-                    <a:srgbClr val="FFFFFF"/>
-                  </a:solidFill>
-                </a:uFill>
-                <a:latin typeface="Arial"/>
-              </a:rPr>
-              <a:t>?</a:t>
-            </a:r>
-            <a:endParaRPr lang="de-DE" sz="3200" b="0" strike="noStrike" spc="-1" dirty="0">
-              <a:solidFill>
-                <a:srgbClr val="000000"/>
-              </a:solidFill>
-              <a:uFill>
-                <a:solidFill>
-                  <a:srgbClr val="FFFFFF"/>
-                </a:solidFill>
-              </a:uFill>
-              <a:latin typeface="Arial"/>
-            </a:endParaRPr>
-          </a:p>
-        </p:txBody>
-      </p:sp>
-      <p:sp>
-        <p:nvSpPr>
           <p:cNvPr id="193" name="TextShape 2"/>
           <p:cNvSpPr txBox="1"/>
           <p:nvPr/>
@@ -25539,6 +25926,182 @@
           </a:p>
         </p:txBody>
       </p:sp>
+      <p:sp>
+        <p:nvSpPr>
+          <p:cNvPr id="7" name="TextShape 1">
+            <a:extLst>
+              <a:ext uri="{FF2B5EF4-FFF2-40B4-BE49-F238E27FC236}">
+                <a16:creationId xmlns:a16="http://schemas.microsoft.com/office/drawing/2014/main" id="{2326EA60-A2A5-4E7E-BAC9-41CC5B24CBA8}"/>
+              </a:ext>
+            </a:extLst>
+          </p:cNvPr>
+          <p:cNvSpPr txBox="1"/>
+          <p:nvPr/>
+        </p:nvSpPr>
+        <p:spPr>
+          <a:xfrm>
+            <a:off x="468360" y="1221480"/>
+            <a:ext cx="8206920" cy="356760"/>
+          </a:xfrm>
+          <a:prstGeom prst="rect">
+            <a:avLst/>
+          </a:prstGeom>
+          <a:noFill/>
+          <a:ln>
+            <a:noFill/>
+          </a:ln>
+        </p:spPr>
+        <p:txBody>
+          <a:bodyPr lIns="0" tIns="0" rIns="0" bIns="0" anchor="ctr"/>
+          <a:lstStyle/>
+          <a:p>
+            <a:pPr marL="343080" indent="-342720">
+              <a:lnSpc>
+                <a:spcPct val="100000"/>
+              </a:lnSpc>
+            </a:pPr>
+            <a:r>
+              <a:rPr lang="de-DE" sz="2400" b="1" strike="noStrike" spc="-1" dirty="0" err="1">
+                <a:solidFill>
+                  <a:srgbClr val="4F81BD"/>
+                </a:solidFill>
+                <a:uFill>
+                  <a:solidFill>
+                    <a:srgbClr val="FFFFFF"/>
+                  </a:solidFill>
+                </a:uFill>
+                <a:latin typeface="Arial"/>
+                <a:ea typeface="Arial"/>
+              </a:rPr>
+              <a:t>What</a:t>
+            </a:r>
+            <a:r>
+              <a:rPr lang="de-DE" sz="2400" b="1" strike="noStrike" spc="-1" dirty="0">
+                <a:solidFill>
+                  <a:srgbClr val="4F81BD"/>
+                </a:solidFill>
+                <a:uFill>
+                  <a:solidFill>
+                    <a:srgbClr val="FFFFFF"/>
+                  </a:solidFill>
+                </a:uFill>
+                <a:latin typeface="Arial"/>
+                <a:ea typeface="Arial"/>
+              </a:rPr>
+              <a:t> do </a:t>
+            </a:r>
+            <a:r>
+              <a:rPr lang="de-DE" sz="2400" b="1" strike="noStrike" spc="-1" dirty="0" err="1">
+                <a:solidFill>
+                  <a:srgbClr val="4F81BD"/>
+                </a:solidFill>
+                <a:uFill>
+                  <a:solidFill>
+                    <a:srgbClr val="FFFFFF"/>
+                  </a:solidFill>
+                </a:uFill>
+                <a:latin typeface="Arial"/>
+                <a:ea typeface="Arial"/>
+              </a:rPr>
+              <a:t>you</a:t>
+            </a:r>
+            <a:r>
+              <a:rPr lang="de-DE" sz="2400" b="1" strike="noStrike" spc="-1" dirty="0">
+                <a:solidFill>
+                  <a:srgbClr val="4F81BD"/>
+                </a:solidFill>
+                <a:uFill>
+                  <a:solidFill>
+                    <a:srgbClr val="FFFFFF"/>
+                  </a:solidFill>
+                </a:uFill>
+                <a:latin typeface="Arial"/>
+                <a:ea typeface="Arial"/>
+              </a:rPr>
+              <a:t> </a:t>
+            </a:r>
+            <a:r>
+              <a:rPr lang="de-DE" sz="2400" b="1" strike="noStrike" spc="-1" dirty="0" err="1">
+                <a:solidFill>
+                  <a:srgbClr val="4F81BD"/>
+                </a:solidFill>
+                <a:uFill>
+                  <a:solidFill>
+                    <a:srgbClr val="FFFFFF"/>
+                  </a:solidFill>
+                </a:uFill>
+                <a:latin typeface="Arial"/>
+                <a:ea typeface="Arial"/>
+              </a:rPr>
+              <a:t>expect</a:t>
+            </a:r>
+            <a:r>
+              <a:rPr lang="de-DE" sz="2400" b="1" strike="noStrike" spc="-1" dirty="0">
+                <a:solidFill>
+                  <a:srgbClr val="4F81BD"/>
+                </a:solidFill>
+                <a:uFill>
+                  <a:solidFill>
+                    <a:srgbClr val="FFFFFF"/>
+                  </a:solidFill>
+                </a:uFill>
+                <a:latin typeface="Arial"/>
+                <a:ea typeface="Arial"/>
+              </a:rPr>
+              <a:t>?</a:t>
+            </a:r>
+            <a:endParaRPr lang="de-DE" sz="3200" b="0" strike="noStrike" spc="-1" dirty="0">
+              <a:solidFill>
+                <a:srgbClr val="000000"/>
+              </a:solidFill>
+              <a:uFill>
+                <a:solidFill>
+                  <a:srgbClr val="FFFFFF"/>
+                </a:solidFill>
+              </a:uFill>
+              <a:latin typeface="Arial"/>
+            </a:endParaRPr>
+          </a:p>
+        </p:txBody>
+      </p:sp>
+      <p:pic>
+        <p:nvPicPr>
+          <p:cNvPr id="8" name="giphy1">
+            <a:hlinkClick r:id="" action="ppaction://media"/>
+            <a:extLst>
+              <a:ext uri="{FF2B5EF4-FFF2-40B4-BE49-F238E27FC236}">
+                <a16:creationId xmlns:a16="http://schemas.microsoft.com/office/drawing/2014/main" id="{C50CA36E-5068-4FE8-B189-AEE3F463C869}"/>
+              </a:ext>
+            </a:extLst>
+          </p:cNvPr>
+          <p:cNvPicPr>
+            <a:picLocks noChangeAspect="1"/>
+          </p:cNvPicPr>
+          <p:nvPr>
+            <a:videoFile r:link="rId2"/>
+            <p:extLst>
+              <p:ext uri="{DAA4B4D4-6D71-4841-9C94-3DE7FCFB9230}">
+                <p14:media xmlns:p14="http://schemas.microsoft.com/office/powerpoint/2010/main" r:embed="rId1"/>
+              </p:ext>
+            </p:extLst>
+          </p:nvPr>
+        </p:nvPicPr>
+        <p:blipFill>
+          <a:blip r:embed="rId4"/>
+          <a:stretch>
+            <a:fillRect/>
+          </a:stretch>
+        </p:blipFill>
+        <p:spPr>
+          <a:xfrm>
+            <a:off x="2267744" y="2636912"/>
+            <a:ext cx="4608512" cy="2592288"/>
+          </a:xfrm>
+          <a:prstGeom prst="rect">
+            <a:avLst/>
+          </a:prstGeom>
+        </p:spPr>
+      </p:pic>
     </p:spTree>
     <p:extLst>
       <p:ext uri="{BB962C8B-B14F-4D97-AF65-F5344CB8AC3E}">
@@ -25554,8 +26117,49 @@
       <p:par>
         <p:cTn id="1" dur="indefinite" restart="never" nodeType="tmRoot">
           <p:childTnLst>
-            <p:seq>
-              <p:cTn id="2" nodeType="mainSeq"/>
+            <p:seq concurrent="1" nextAc="seek">
+              <p:cTn id="2" dur="indefinite" nodeType="mainSeq">
+                <p:childTnLst>
+                  <p:par>
+                    <p:cTn id="3" fill="hold">
+                      <p:stCondLst>
+                        <p:cond delay="indefinite"/>
+                        <p:cond evt="onBegin" delay="0">
+                          <p:tn val="2"/>
+                        </p:cond>
+                      </p:stCondLst>
+                      <p:childTnLst>
+                        <p:par>
+                          <p:cTn id="4" fill="hold">
+                            <p:stCondLst>
+                              <p:cond delay="0"/>
+                            </p:stCondLst>
+                            <p:childTnLst>
+                              <p:par>
+                                <p:cTn id="5" presetID="1" presetClass="mediacall" presetSubtype="0" fill="hold" nodeType="afterEffect">
+                                  <p:stCondLst>
+                                    <p:cond delay="0"/>
+                                  </p:stCondLst>
+                                  <p:childTnLst>
+                                    <p:cmd type="call" cmd="playFrom(0.0)">
+                                      <p:cBhvr>
+                                        <p:cTn id="6" dur="2920" fill="hold"/>
+                                        <p:tgtEl>
+                                          <p:spTgt spid="8"/>
+                                        </p:tgtEl>
+                                      </p:cBhvr>
+                                    </p:cmd>
+                                  </p:childTnLst>
+                                </p:cTn>
+                              </p:par>
+                            </p:childTnLst>
+                          </p:cTn>
+                        </p:par>
+                      </p:childTnLst>
+                    </p:cTn>
+                  </p:par>
+                </p:childTnLst>
+              </p:cTn>
               <p:prevCondLst>
                 <p:cond evt="onPrev" delay="0">
                   <p:tgtEl>
@@ -25567,6 +26171,634 @@
                 <p:cond evt="onNext" delay="0">
                   <p:tgtEl>
                     <p:sldTgt/>
+                  </p:tgtEl>
+                </p:cond>
+              </p:nextCondLst>
+            </p:seq>
+            <p:video>
+              <p:cMediaNode vol="80000">
+                <p:cTn id="7" fill="hold" display="0">
+                  <p:stCondLst>
+                    <p:cond delay="indefinite"/>
+                  </p:stCondLst>
+                </p:cTn>
+                <p:tgtEl>
+                  <p:spTgt spid="8"/>
+                </p:tgtEl>
+              </p:cMediaNode>
+            </p:video>
+            <p:seq concurrent="1" nextAc="seek">
+              <p:cTn id="8" restart="whenNotActive" fill="hold" evtFilter="cancelBubble" nodeType="interactiveSeq">
+                <p:stCondLst>
+                  <p:cond evt="onClick" delay="0">
+                    <p:tgtEl>
+                      <p:spTgt spid="8"/>
+                    </p:tgtEl>
+                  </p:cond>
+                </p:stCondLst>
+                <p:endSync evt="end" delay="0">
+                  <p:rtn val="all"/>
+                </p:endSync>
+                <p:childTnLst>
+                  <p:par>
+                    <p:cTn id="9" fill="hold">
+                      <p:stCondLst>
+                        <p:cond delay="0"/>
+                      </p:stCondLst>
+                      <p:childTnLst>
+                        <p:par>
+                          <p:cTn id="10" fill="hold">
+                            <p:stCondLst>
+                              <p:cond delay="0"/>
+                            </p:stCondLst>
+                            <p:childTnLst>
+                              <p:par>
+                                <p:cTn id="11" presetID="2" presetClass="mediacall" presetSubtype="0" fill="hold" nodeType="clickEffect">
+                                  <p:stCondLst>
+                                    <p:cond delay="0"/>
+                                  </p:stCondLst>
+                                  <p:childTnLst>
+                                    <p:cmd type="call" cmd="togglePause">
+                                      <p:cBhvr>
+                                        <p:cTn id="12" dur="1" fill="hold"/>
+                                        <p:tgtEl>
+                                          <p:spTgt spid="8"/>
+                                        </p:tgtEl>
+                                      </p:cBhvr>
+                                    </p:cmd>
+                                  </p:childTnLst>
+                                </p:cTn>
+                              </p:par>
+                            </p:childTnLst>
+                          </p:cTn>
+                        </p:par>
+                      </p:childTnLst>
+                    </p:cTn>
+                  </p:par>
+                </p:childTnLst>
+              </p:cTn>
+              <p:nextCondLst>
+                <p:cond evt="onClick" delay="0">
+                  <p:tgtEl>
+                    <p:spTgt spid="8"/>
+                  </p:tgtEl>
+                </p:cond>
+              </p:nextCondLst>
+            </p:seq>
+          </p:childTnLst>
+        </p:cTn>
+      </p:par>
+    </p:tnLst>
+  </p:timing>
+</p:sld>
+</file>
+
+<file path=ppt/slides/slide40.xml><?xml version="1.0" encoding="utf-8"?>
+<p:sld xmlns:a="http://schemas.openxmlformats.org/drawingml/2006/main" xmlns:r="http://schemas.openxmlformats.org/officeDocument/2006/relationships" xmlns:p="http://schemas.openxmlformats.org/presentationml/2006/main">
+  <p:cSld>
+    <p:spTree>
+      <p:nvGrpSpPr>
+        <p:cNvPr id="1" name=""/>
+        <p:cNvGrpSpPr/>
+        <p:nvPr/>
+      </p:nvGrpSpPr>
+      <p:grpSpPr>
+        <a:xfrm>
+          <a:off x="0" y="0"/>
+          <a:ext cx="0" cy="0"/>
+          <a:chOff x="0" y="0"/>
+          <a:chExt cx="0" cy="0"/>
+        </a:xfrm>
+      </p:grpSpPr>
+      <p:sp>
+        <p:nvSpPr>
+          <p:cNvPr id="193" name="TextShape 2"/>
+          <p:cNvSpPr txBox="1"/>
+          <p:nvPr/>
+        </p:nvSpPr>
+        <p:spPr>
+          <a:xfrm>
+            <a:off x="468360" y="242280"/>
+            <a:ext cx="5882760" cy="713880"/>
+          </a:xfrm>
+          <a:prstGeom prst="rect">
+            <a:avLst/>
+          </a:prstGeom>
+          <a:noFill/>
+          <a:ln>
+            <a:noFill/>
+          </a:ln>
+        </p:spPr>
+        <p:txBody>
+          <a:bodyPr lIns="0" tIns="0" rIns="0" bIns="0" anchor="b"/>
+          <a:lstStyle/>
+          <a:p>
+            <a:pPr>
+              <a:lnSpc>
+                <a:spcPct val="100000"/>
+              </a:lnSpc>
+            </a:pPr>
+            <a:r>
+              <a:rPr lang="de-DE" sz="2400" b="1" strike="noStrike" spc="-1" dirty="0">
+                <a:solidFill>
+                  <a:srgbClr val="000000"/>
+                </a:solidFill>
+                <a:uFill>
+                  <a:solidFill>
+                    <a:srgbClr val="FFFFFF"/>
+                  </a:solidFill>
+                </a:uFill>
+                <a:latin typeface="Arial"/>
+              </a:rPr>
+              <a:t>Classification </a:t>
+            </a:r>
+            <a:r>
+              <a:rPr lang="de-DE" sz="2400" b="1" strike="noStrike" spc="-1" dirty="0" err="1">
+                <a:solidFill>
+                  <a:srgbClr val="000000"/>
+                </a:solidFill>
+                <a:uFill>
+                  <a:solidFill>
+                    <a:srgbClr val="FFFFFF"/>
+                  </a:solidFill>
+                </a:uFill>
+                <a:latin typeface="Arial"/>
+              </a:rPr>
+              <a:t>with</a:t>
+            </a:r>
+            <a:r>
+              <a:rPr lang="de-DE" sz="2400" b="1" strike="noStrike" spc="-1" dirty="0">
+                <a:solidFill>
+                  <a:srgbClr val="000000"/>
+                </a:solidFill>
+                <a:uFill>
+                  <a:solidFill>
+                    <a:srgbClr val="FFFFFF"/>
+                  </a:solidFill>
+                </a:uFill>
+                <a:latin typeface="Arial"/>
+              </a:rPr>
+              <a:t> </a:t>
+            </a:r>
+            <a:r>
+              <a:rPr lang="de-DE" sz="2400" b="1" strike="noStrike" spc="-1" dirty="0" err="1">
+                <a:solidFill>
+                  <a:srgbClr val="000000"/>
+                </a:solidFill>
+                <a:uFill>
+                  <a:solidFill>
+                    <a:srgbClr val="FFFFFF"/>
+                  </a:solidFill>
+                </a:uFill>
+                <a:latin typeface="Arial"/>
+              </a:rPr>
+              <a:t>Neural</a:t>
+            </a:r>
+            <a:r>
+              <a:rPr lang="de-DE" sz="2400" b="1" strike="noStrike" spc="-1" dirty="0">
+                <a:solidFill>
+                  <a:srgbClr val="000000"/>
+                </a:solidFill>
+                <a:uFill>
+                  <a:solidFill>
+                    <a:srgbClr val="FFFFFF"/>
+                  </a:solidFill>
+                </a:uFill>
+                <a:latin typeface="Arial"/>
+              </a:rPr>
+              <a:t> Network</a:t>
+            </a:r>
+            <a:endParaRPr lang="de-DE" sz="3200" b="0" strike="noStrike" spc="-1" dirty="0">
+              <a:solidFill>
+                <a:srgbClr val="000000"/>
+              </a:solidFill>
+              <a:uFill>
+                <a:solidFill>
+                  <a:srgbClr val="FFFFFF"/>
+                </a:solidFill>
+              </a:uFill>
+              <a:latin typeface="Arial"/>
+            </a:endParaRPr>
+          </a:p>
+        </p:txBody>
+      </p:sp>
+      <p:sp>
+        <p:nvSpPr>
+          <p:cNvPr id="5" name="TextShape 3">
+            <a:extLst>
+              <a:ext uri="{FF2B5EF4-FFF2-40B4-BE49-F238E27FC236}">
+                <a16:creationId xmlns:a16="http://schemas.microsoft.com/office/drawing/2014/main" id="{B87C0B4A-A352-4A40-AE98-79D6D03AC4F3}"/>
+              </a:ext>
+            </a:extLst>
+          </p:cNvPr>
+          <p:cNvSpPr txBox="1"/>
+          <p:nvPr/>
+        </p:nvSpPr>
+        <p:spPr>
+          <a:xfrm>
+            <a:off x="468360" y="1989000"/>
+            <a:ext cx="8206920" cy="4247640"/>
+          </a:xfrm>
+          <a:prstGeom prst="rect">
+            <a:avLst/>
+          </a:prstGeom>
+          <a:noFill/>
+          <a:ln>
+            <a:noFill/>
+          </a:ln>
+        </p:spPr>
+        <p:txBody>
+          <a:bodyPr lIns="0" tIns="0" rIns="0" bIns="0"/>
+          <a:lstStyle/>
+          <a:p>
+            <a:pPr marL="343080" indent="-342720">
+              <a:lnSpc>
+                <a:spcPct val="200000"/>
+              </a:lnSpc>
+              <a:buClr>
+                <a:srgbClr val="8064A2"/>
+              </a:buClr>
+              <a:buFont typeface="Arial"/>
+              <a:buChar char="&gt;"/>
+            </a:pPr>
+            <a:endParaRPr lang="en-US" sz="2400" spc="-1" dirty="0">
+              <a:solidFill>
+                <a:srgbClr val="000000"/>
+              </a:solidFill>
+              <a:uFill>
+                <a:solidFill>
+                  <a:srgbClr val="FFFFFF"/>
+                </a:solidFill>
+              </a:uFill>
+            </a:endParaRPr>
+          </a:p>
+        </p:txBody>
+      </p:sp>
+      <p:sp>
+        <p:nvSpPr>
+          <p:cNvPr id="4" name="TextShape 1">
+            <a:extLst>
+              <a:ext uri="{FF2B5EF4-FFF2-40B4-BE49-F238E27FC236}">
+                <a16:creationId xmlns:a16="http://schemas.microsoft.com/office/drawing/2014/main" id="{61D68AE3-5F19-42F7-9DF6-915400F2E90F}"/>
+              </a:ext>
+            </a:extLst>
+          </p:cNvPr>
+          <p:cNvSpPr txBox="1"/>
+          <p:nvPr/>
+        </p:nvSpPr>
+        <p:spPr>
+          <a:xfrm>
+            <a:off x="468360" y="1221480"/>
+            <a:ext cx="8206920" cy="356760"/>
+          </a:xfrm>
+          <a:prstGeom prst="rect">
+            <a:avLst/>
+          </a:prstGeom>
+          <a:noFill/>
+          <a:ln>
+            <a:noFill/>
+          </a:ln>
+        </p:spPr>
+        <p:txBody>
+          <a:bodyPr lIns="0" tIns="0" rIns="0" bIns="0" anchor="ctr"/>
+          <a:lstStyle/>
+          <a:p>
+            <a:pPr marL="343080" indent="-342720">
+              <a:lnSpc>
+                <a:spcPct val="100000"/>
+              </a:lnSpc>
+            </a:pPr>
+            <a:r>
+              <a:rPr lang="de-DE" sz="2400" b="1" spc="-1" dirty="0" err="1">
+                <a:solidFill>
+                  <a:srgbClr val="4F81BD"/>
+                </a:solidFill>
+                <a:uFill>
+                  <a:solidFill>
+                    <a:srgbClr val="FFFFFF"/>
+                  </a:solidFill>
+                </a:uFill>
+                <a:latin typeface="Arial"/>
+              </a:rPr>
+              <a:t>Let‘s</a:t>
+            </a:r>
+            <a:r>
+              <a:rPr lang="de-DE" sz="2400" b="1" spc="-1" dirty="0">
+                <a:solidFill>
+                  <a:srgbClr val="4F81BD"/>
+                </a:solidFill>
+                <a:uFill>
+                  <a:solidFill>
+                    <a:srgbClr val="FFFFFF"/>
+                  </a:solidFill>
+                </a:uFill>
+                <a:latin typeface="Arial"/>
+              </a:rPr>
+              <a:t> </a:t>
+            </a:r>
+            <a:r>
+              <a:rPr lang="de-DE" sz="2400" b="1" spc="-1" dirty="0" err="1">
+                <a:solidFill>
+                  <a:srgbClr val="4F81BD"/>
+                </a:solidFill>
+                <a:uFill>
+                  <a:solidFill>
+                    <a:srgbClr val="FFFFFF"/>
+                  </a:solidFill>
+                </a:uFill>
+                <a:latin typeface="Arial"/>
+              </a:rPr>
+              <a:t>get</a:t>
+            </a:r>
+            <a:r>
+              <a:rPr lang="de-DE" sz="2400" b="1" spc="-1" dirty="0">
+                <a:solidFill>
+                  <a:srgbClr val="4F81BD"/>
+                </a:solidFill>
+                <a:uFill>
+                  <a:solidFill>
+                    <a:srgbClr val="FFFFFF"/>
+                  </a:solidFill>
+                </a:uFill>
+                <a:latin typeface="Arial"/>
+              </a:rPr>
+              <a:t> </a:t>
+            </a:r>
+            <a:r>
+              <a:rPr lang="de-DE" sz="2400" b="1" spc="-1" dirty="0" err="1">
+                <a:solidFill>
+                  <a:srgbClr val="4F81BD"/>
+                </a:solidFill>
+                <a:uFill>
+                  <a:solidFill>
+                    <a:srgbClr val="FFFFFF"/>
+                  </a:solidFill>
+                </a:uFill>
+                <a:latin typeface="Arial"/>
+              </a:rPr>
+              <a:t>our</a:t>
+            </a:r>
+            <a:r>
+              <a:rPr lang="de-DE" sz="2400" b="1" spc="-1" dirty="0">
+                <a:solidFill>
+                  <a:srgbClr val="4F81BD"/>
+                </a:solidFill>
+                <a:uFill>
+                  <a:solidFill>
+                    <a:srgbClr val="FFFFFF"/>
+                  </a:solidFill>
+                </a:uFill>
+                <a:latin typeface="Arial"/>
+              </a:rPr>
+              <a:t> </a:t>
+            </a:r>
+            <a:r>
+              <a:rPr lang="de-DE" sz="2400" b="1" spc="-1" dirty="0" err="1">
+                <a:solidFill>
+                  <a:srgbClr val="4F81BD"/>
+                </a:solidFill>
+                <a:uFill>
+                  <a:solidFill>
+                    <a:srgbClr val="FFFFFF"/>
+                  </a:solidFill>
+                </a:uFill>
+                <a:latin typeface="Arial"/>
+              </a:rPr>
+              <a:t>hands</a:t>
+            </a:r>
+            <a:r>
+              <a:rPr lang="de-DE" sz="2400" b="1" spc="-1" dirty="0">
+                <a:solidFill>
+                  <a:srgbClr val="4F81BD"/>
+                </a:solidFill>
+                <a:uFill>
+                  <a:solidFill>
+                    <a:srgbClr val="FFFFFF"/>
+                  </a:solidFill>
+                </a:uFill>
+                <a:latin typeface="Arial"/>
+              </a:rPr>
+              <a:t> </a:t>
+            </a:r>
+            <a:r>
+              <a:rPr lang="de-DE" sz="2400" b="1" spc="-1" dirty="0" err="1">
+                <a:solidFill>
+                  <a:srgbClr val="4F81BD"/>
+                </a:solidFill>
+                <a:uFill>
+                  <a:solidFill>
+                    <a:srgbClr val="FFFFFF"/>
+                  </a:solidFill>
+                </a:uFill>
+                <a:latin typeface="Arial"/>
+              </a:rPr>
+              <a:t>dirty</a:t>
+            </a:r>
+            <a:r>
+              <a:rPr lang="de-DE" sz="2400" b="1" spc="-1" dirty="0">
+                <a:solidFill>
+                  <a:srgbClr val="4F81BD"/>
+                </a:solidFill>
+                <a:uFill>
+                  <a:solidFill>
+                    <a:srgbClr val="FFFFFF"/>
+                  </a:solidFill>
+                </a:uFill>
+                <a:latin typeface="Arial"/>
+              </a:rPr>
+              <a:t>!</a:t>
+            </a:r>
+            <a:endParaRPr lang="de-DE" sz="3200" b="0" strike="noStrike" spc="-1" dirty="0">
+              <a:solidFill>
+                <a:srgbClr val="000000"/>
+              </a:solidFill>
+              <a:uFill>
+                <a:solidFill>
+                  <a:srgbClr val="FFFFFF"/>
+                </a:solidFill>
+              </a:uFill>
+              <a:latin typeface="Arial"/>
+            </a:endParaRPr>
+          </a:p>
+        </p:txBody>
+      </p:sp>
+      <p:pic>
+        <p:nvPicPr>
+          <p:cNvPr id="2" name="giphy">
+            <a:hlinkClick r:id="" action="ppaction://media"/>
+            <a:extLst>
+              <a:ext uri="{FF2B5EF4-FFF2-40B4-BE49-F238E27FC236}">
+                <a16:creationId xmlns:a16="http://schemas.microsoft.com/office/drawing/2014/main" id="{99235F7D-052E-4269-BE32-B207040C1AE4}"/>
+              </a:ext>
+            </a:extLst>
+          </p:cNvPr>
+          <p:cNvPicPr>
+            <a:picLocks noChangeAspect="1"/>
+          </p:cNvPicPr>
+          <p:nvPr>
+            <a:videoFile r:link="rId2"/>
+            <p:extLst>
+              <p:ext uri="{DAA4B4D4-6D71-4841-9C94-3DE7FCFB9230}">
+                <p14:media xmlns:p14="http://schemas.microsoft.com/office/powerpoint/2010/main" r:embed="rId1"/>
+              </p:ext>
+            </p:extLst>
+          </p:nvPr>
+        </p:nvPicPr>
+        <p:blipFill>
+          <a:blip r:embed="rId4"/>
+          <a:stretch>
+            <a:fillRect/>
+          </a:stretch>
+        </p:blipFill>
+        <p:spPr>
+          <a:xfrm>
+            <a:off x="2467713" y="2564904"/>
+            <a:ext cx="4208574" cy="2736304"/>
+          </a:xfrm>
+          <a:prstGeom prst="rect">
+            <a:avLst/>
+          </a:prstGeom>
+        </p:spPr>
+      </p:pic>
+    </p:spTree>
+    <p:extLst>
+      <p:ext uri="{BB962C8B-B14F-4D97-AF65-F5344CB8AC3E}">
+        <p14:creationId xmlns:p14="http://schemas.microsoft.com/office/powerpoint/2010/main" val="2843779514"/>
+      </p:ext>
+    </p:extLst>
+  </p:cSld>
+  <p:clrMapOvr>
+    <a:masterClrMapping/>
+  </p:clrMapOvr>
+  <p:timing>
+    <p:tnLst>
+      <p:par>
+        <p:cTn id="1" dur="indefinite" restart="never" nodeType="tmRoot">
+          <p:childTnLst>
+            <p:seq concurrent="1" nextAc="seek">
+              <p:cTn id="2" dur="indefinite" nodeType="mainSeq">
+                <p:childTnLst>
+                  <p:par>
+                    <p:cTn id="3" fill="hold">
+                      <p:stCondLst>
+                        <p:cond delay="indefinite"/>
+                        <p:cond evt="onBegin" delay="0">
+                          <p:tn val="2"/>
+                        </p:cond>
+                      </p:stCondLst>
+                      <p:childTnLst>
+                        <p:par>
+                          <p:cTn id="4" fill="hold">
+                            <p:stCondLst>
+                              <p:cond delay="0"/>
+                            </p:stCondLst>
+                            <p:childTnLst>
+                              <p:par>
+                                <p:cTn id="5" presetID="1" presetClass="mediacall" presetSubtype="0" fill="hold" nodeType="afterEffect">
+                                  <p:stCondLst>
+                                    <p:cond delay="0"/>
+                                  </p:stCondLst>
+                                  <p:childTnLst>
+                                    <p:cmd type="call" cmd="playFrom(0.0)">
+                                      <p:cBhvr>
+                                        <p:cTn id="6" dur="3800" fill="hold"/>
+                                        <p:tgtEl>
+                                          <p:spTgt spid="2"/>
+                                        </p:tgtEl>
+                                      </p:cBhvr>
+                                    </p:cmd>
+                                  </p:childTnLst>
+                                </p:cTn>
+                              </p:par>
+                            </p:childTnLst>
+                          </p:cTn>
+                        </p:par>
+                      </p:childTnLst>
+                    </p:cTn>
+                  </p:par>
+                </p:childTnLst>
+              </p:cTn>
+              <p:prevCondLst>
+                <p:cond evt="onPrev" delay="0">
+                  <p:tgtEl>
+                    <p:sldTgt/>
+                  </p:tgtEl>
+                </p:cond>
+              </p:prevCondLst>
+              <p:nextCondLst>
+                <p:cond evt="onNext" delay="0">
+                  <p:tgtEl>
+                    <p:sldTgt/>
+                  </p:tgtEl>
+                </p:cond>
+              </p:nextCondLst>
+            </p:seq>
+            <p:video>
+              <p:cMediaNode vol="80000">
+                <p:cTn id="7" fill="hold" display="0">
+                  <p:stCondLst>
+                    <p:cond delay="indefinite"/>
+                  </p:stCondLst>
+                </p:cTn>
+                <p:tgtEl>
+                  <p:spTgt spid="2"/>
+                </p:tgtEl>
+              </p:cMediaNode>
+            </p:video>
+            <p:seq concurrent="1" nextAc="seek">
+              <p:cTn id="8" restart="whenNotActive" fill="hold" evtFilter="cancelBubble" nodeType="interactiveSeq">
+                <p:stCondLst>
+                  <p:cond evt="onClick" delay="0">
+                    <p:tgtEl>
+                      <p:spTgt spid="2"/>
+                    </p:tgtEl>
+                  </p:cond>
+                </p:stCondLst>
+                <p:endSync evt="end" delay="0">
+                  <p:rtn val="all"/>
+                </p:endSync>
+                <p:childTnLst>
+                  <p:par>
+                    <p:cTn id="9" fill="hold">
+                      <p:stCondLst>
+                        <p:cond delay="0"/>
+                      </p:stCondLst>
+                      <p:childTnLst>
+                        <p:par>
+                          <p:cTn id="10" fill="hold">
+                            <p:stCondLst>
+                              <p:cond delay="0"/>
+                            </p:stCondLst>
+                            <p:childTnLst>
+                              <p:par>
+                                <p:cTn id="11" presetID="2" presetClass="mediacall" presetSubtype="0" fill="hold" nodeType="clickEffect">
+                                  <p:stCondLst>
+                                    <p:cond delay="0"/>
+                                  </p:stCondLst>
+                                  <p:childTnLst>
+                                    <p:cmd type="call" cmd="togglePause">
+                                      <p:cBhvr>
+                                        <p:cTn id="12" dur="1" fill="hold"/>
+                                        <p:tgtEl>
+                                          <p:spTgt spid="2"/>
+                                        </p:tgtEl>
+                                      </p:cBhvr>
+                                    </p:cmd>
+                                  </p:childTnLst>
+                                </p:cTn>
+                              </p:par>
+                            </p:childTnLst>
+                          </p:cTn>
+                        </p:par>
+                      </p:childTnLst>
+                    </p:cTn>
+                  </p:par>
+                </p:childTnLst>
+              </p:cTn>
+              <p:nextCondLst>
+                <p:cond evt="onClick" delay="0">
+                  <p:tgtEl>
+                    <p:spTgt spid="2"/>
                   </p:tgtEl>
                 </p:cond>
               </p:nextCondLst>

</xml_diff>

<commit_message>
Fixed some copy paste errors
</commit_message>
<xml_diff>
--- a/docs/introduction.pptx
+++ b/docs/introduction.pptx
@@ -19503,7 +19503,7 @@
           <a:p>
             <a:r>
               <a:rPr lang="de-DE" dirty="0"/>
-              <a:t>Multi Class Problem – </a:t>
+              <a:t>Multi Class Classification – </a:t>
             </a:r>
             <a:r>
               <a:rPr lang="de-DE" dirty="0" err="1"/>
@@ -19840,12 +19840,8 @@
           <a:lstStyle/>
           <a:p>
             <a:r>
-              <a:rPr lang="de-DE" dirty="0" err="1"/>
-              <a:t>Multiclass</a:t>
-            </a:r>
-            <a:r>
               <a:rPr lang="de-DE" dirty="0"/>
-              <a:t> </a:t>
+              <a:t>Multi Class Classification – </a:t>
             </a:r>
             <a:r>
               <a:rPr lang="de-DE" dirty="0" err="1"/>
@@ -19853,7 +19849,7 @@
             </a:r>
             <a:r>
               <a:rPr lang="de-DE" dirty="0"/>
-              <a:t> (1)</a:t>
+              <a:t>! (1)</a:t>
             </a:r>
           </a:p>
         </p:txBody>
@@ -20004,12 +20000,8 @@
           <a:lstStyle/>
           <a:p>
             <a:r>
-              <a:rPr lang="de-DE" dirty="0" err="1"/>
-              <a:t>Multiclass</a:t>
-            </a:r>
-            <a:r>
               <a:rPr lang="de-DE" dirty="0"/>
-              <a:t> </a:t>
+              <a:t>Multi Class Classification – </a:t>
             </a:r>
             <a:r>
               <a:rPr lang="de-DE" dirty="0" err="1"/>
@@ -20017,7 +20009,7 @@
             </a:r>
             <a:r>
               <a:rPr lang="de-DE" dirty="0"/>
-              <a:t> (1)</a:t>
+              <a:t>! (2)</a:t>
             </a:r>
           </a:p>
         </p:txBody>
@@ -20037,10 +20029,47 @@
           <a:bodyPr/>
           <a:lstStyle/>
           <a:p>
-            <a:r>
-              <a:rPr lang="de-DE" dirty="0"/>
-              <a:t>Aufgabe – Sitzung7</a:t>
-            </a:r>
+            <a:pPr>
+              <a:lnSpc>
+                <a:spcPct val="100000"/>
+              </a:lnSpc>
+            </a:pPr>
+            <a:r>
+              <a:rPr lang="de-DE" spc="-1" dirty="0" err="1">
+                <a:solidFill>
+                  <a:srgbClr val="000000"/>
+                </a:solidFill>
+                <a:uFill>
+                  <a:solidFill>
+                    <a:srgbClr val="FFFFFF"/>
+                  </a:solidFill>
+                </a:uFill>
+              </a:rPr>
+              <a:t>Neural</a:t>
+            </a:r>
+            <a:r>
+              <a:rPr lang="de-DE" spc="-1" dirty="0">
+                <a:solidFill>
+                  <a:srgbClr val="000000"/>
+                </a:solidFill>
+                <a:uFill>
+                  <a:solidFill>
+                    <a:srgbClr val="FFFFFF"/>
+                  </a:solidFill>
+                </a:uFill>
+              </a:rPr>
+              <a:t> Network Basics</a:t>
+            </a:r>
+            <a:endParaRPr lang="de-DE" sz="3200" b="0" spc="-1" dirty="0">
+              <a:solidFill>
+                <a:srgbClr val="000000"/>
+              </a:solidFill>
+              <a:uFill>
+                <a:solidFill>
+                  <a:srgbClr val="FFFFFF"/>
+                </a:solidFill>
+              </a:uFill>
+            </a:endParaRPr>
           </a:p>
         </p:txBody>
       </p:sp>
@@ -20615,7 +20644,15 @@
           <a:p>
             <a:r>
               <a:rPr lang="de-DE" dirty="0"/>
-              <a:t>Multiclass Classification – Perceptron!</a:t>
+              <a:t>Multi Class Classification – </a:t>
+            </a:r>
+            <a:r>
+              <a:rPr lang="de-DE" dirty="0" err="1"/>
+              <a:t>Perceptron</a:t>
+            </a:r>
+            <a:r>
+              <a:rPr lang="de-DE" dirty="0"/>
+              <a:t>! (3)</a:t>
             </a:r>
           </a:p>
         </p:txBody>
@@ -20635,10 +20672,47 @@
           <a:bodyPr/>
           <a:lstStyle/>
           <a:p>
-            <a:r>
-              <a:rPr lang="de-DE" dirty="0"/>
-              <a:t>Aufgabe – Sitzung7</a:t>
-            </a:r>
+            <a:pPr>
+              <a:lnSpc>
+                <a:spcPct val="100000"/>
+              </a:lnSpc>
+            </a:pPr>
+            <a:r>
+              <a:rPr lang="de-DE" spc="-1" dirty="0" err="1">
+                <a:solidFill>
+                  <a:srgbClr val="000000"/>
+                </a:solidFill>
+                <a:uFill>
+                  <a:solidFill>
+                    <a:srgbClr val="FFFFFF"/>
+                  </a:solidFill>
+                </a:uFill>
+              </a:rPr>
+              <a:t>Neural</a:t>
+            </a:r>
+            <a:r>
+              <a:rPr lang="de-DE" spc="-1" dirty="0">
+                <a:solidFill>
+                  <a:srgbClr val="000000"/>
+                </a:solidFill>
+                <a:uFill>
+                  <a:solidFill>
+                    <a:srgbClr val="FFFFFF"/>
+                  </a:solidFill>
+                </a:uFill>
+              </a:rPr>
+              <a:t> Network Basics</a:t>
+            </a:r>
+            <a:endParaRPr lang="de-DE" sz="3200" b="0" spc="-1" dirty="0">
+              <a:solidFill>
+                <a:srgbClr val="000000"/>
+              </a:solidFill>
+              <a:uFill>
+                <a:solidFill>
+                  <a:srgbClr val="FFFFFF"/>
+                </a:solidFill>
+              </a:uFill>
+            </a:endParaRPr>
           </a:p>
         </p:txBody>
       </p:sp>
@@ -21146,7 +21220,15 @@
           <a:p>
             <a:r>
               <a:rPr lang="de-DE" dirty="0"/>
-              <a:t>Multiclass Classification – Perceptron!</a:t>
+              <a:t>Multi Class Classification – </a:t>
+            </a:r>
+            <a:r>
+              <a:rPr lang="de-DE" dirty="0" err="1"/>
+              <a:t>Perceptron</a:t>
+            </a:r>
+            <a:r>
+              <a:rPr lang="de-DE" dirty="0"/>
+              <a:t>! (4)</a:t>
             </a:r>
           </a:p>
         </p:txBody>
@@ -21166,10 +21248,47 @@
           <a:bodyPr/>
           <a:lstStyle/>
           <a:p>
-            <a:r>
-              <a:rPr lang="de-DE" dirty="0"/>
-              <a:t>Aufgabe – Sitzung7</a:t>
-            </a:r>
+            <a:pPr>
+              <a:lnSpc>
+                <a:spcPct val="100000"/>
+              </a:lnSpc>
+            </a:pPr>
+            <a:r>
+              <a:rPr lang="de-DE" spc="-1" dirty="0" err="1">
+                <a:solidFill>
+                  <a:srgbClr val="000000"/>
+                </a:solidFill>
+                <a:uFill>
+                  <a:solidFill>
+                    <a:srgbClr val="FFFFFF"/>
+                  </a:solidFill>
+                </a:uFill>
+              </a:rPr>
+              <a:t>Neural</a:t>
+            </a:r>
+            <a:r>
+              <a:rPr lang="de-DE" spc="-1" dirty="0">
+                <a:solidFill>
+                  <a:srgbClr val="000000"/>
+                </a:solidFill>
+                <a:uFill>
+                  <a:solidFill>
+                    <a:srgbClr val="FFFFFF"/>
+                  </a:solidFill>
+                </a:uFill>
+              </a:rPr>
+              <a:t> Network Basics</a:t>
+            </a:r>
+            <a:endParaRPr lang="de-DE" sz="3200" b="0" spc="-1" dirty="0">
+              <a:solidFill>
+                <a:srgbClr val="000000"/>
+              </a:solidFill>
+              <a:uFill>
+                <a:solidFill>
+                  <a:srgbClr val="FFFFFF"/>
+                </a:solidFill>
+              </a:uFill>
+            </a:endParaRPr>
           </a:p>
         </p:txBody>
       </p:sp>
@@ -21676,7 +21795,15 @@
           <a:p>
             <a:r>
               <a:rPr lang="de-DE" dirty="0"/>
-              <a:t>Multiclass Classification – Perceptron!</a:t>
+              <a:t>Multi Class Classification – </a:t>
+            </a:r>
+            <a:r>
+              <a:rPr lang="de-DE" dirty="0" err="1"/>
+              <a:t>Perceptron</a:t>
+            </a:r>
+            <a:r>
+              <a:rPr lang="de-DE" dirty="0"/>
+              <a:t>! (5)</a:t>
             </a:r>
           </a:p>
         </p:txBody>
@@ -21696,10 +21823,47 @@
           <a:bodyPr/>
           <a:lstStyle/>
           <a:p>
-            <a:r>
-              <a:rPr lang="de-DE" dirty="0"/>
-              <a:t>Aufgabe – Sitzung7</a:t>
-            </a:r>
+            <a:pPr>
+              <a:lnSpc>
+                <a:spcPct val="100000"/>
+              </a:lnSpc>
+            </a:pPr>
+            <a:r>
+              <a:rPr lang="de-DE" spc="-1" dirty="0" err="1">
+                <a:solidFill>
+                  <a:srgbClr val="000000"/>
+                </a:solidFill>
+                <a:uFill>
+                  <a:solidFill>
+                    <a:srgbClr val="FFFFFF"/>
+                  </a:solidFill>
+                </a:uFill>
+              </a:rPr>
+              <a:t>Neural</a:t>
+            </a:r>
+            <a:r>
+              <a:rPr lang="de-DE" spc="-1" dirty="0">
+                <a:solidFill>
+                  <a:srgbClr val="000000"/>
+                </a:solidFill>
+                <a:uFill>
+                  <a:solidFill>
+                    <a:srgbClr val="FFFFFF"/>
+                  </a:solidFill>
+                </a:uFill>
+              </a:rPr>
+              <a:t> Network Basics</a:t>
+            </a:r>
+            <a:endParaRPr lang="de-DE" sz="3200" b="0" spc="-1" dirty="0">
+              <a:solidFill>
+                <a:srgbClr val="000000"/>
+              </a:solidFill>
+              <a:uFill>
+                <a:solidFill>
+                  <a:srgbClr val="FFFFFF"/>
+                </a:solidFill>
+              </a:uFill>
+            </a:endParaRPr>
           </a:p>
         </p:txBody>
       </p:sp>
@@ -22072,7 +22236,15 @@
           <a:p>
             <a:r>
               <a:rPr lang="de-DE" dirty="0"/>
-              <a:t>Multiclass Classification – Perceptron!</a:t>
+              <a:t>Multi Class Classification – </a:t>
+            </a:r>
+            <a:r>
+              <a:rPr lang="de-DE" dirty="0" err="1"/>
+              <a:t>Perceptron</a:t>
+            </a:r>
+            <a:r>
+              <a:rPr lang="de-DE" dirty="0"/>
+              <a:t>! (6)</a:t>
             </a:r>
           </a:p>
         </p:txBody>
@@ -22092,10 +22264,47 @@
           <a:bodyPr/>
           <a:lstStyle/>
           <a:p>
-            <a:r>
-              <a:rPr lang="de-DE" dirty="0"/>
-              <a:t>Aufgabe – Sitzung7</a:t>
-            </a:r>
+            <a:pPr>
+              <a:lnSpc>
+                <a:spcPct val="100000"/>
+              </a:lnSpc>
+            </a:pPr>
+            <a:r>
+              <a:rPr lang="de-DE" spc="-1" dirty="0" err="1">
+                <a:solidFill>
+                  <a:srgbClr val="000000"/>
+                </a:solidFill>
+                <a:uFill>
+                  <a:solidFill>
+                    <a:srgbClr val="FFFFFF"/>
+                  </a:solidFill>
+                </a:uFill>
+              </a:rPr>
+              <a:t>Neural</a:t>
+            </a:r>
+            <a:r>
+              <a:rPr lang="de-DE" spc="-1" dirty="0">
+                <a:solidFill>
+                  <a:srgbClr val="000000"/>
+                </a:solidFill>
+                <a:uFill>
+                  <a:solidFill>
+                    <a:srgbClr val="FFFFFF"/>
+                  </a:solidFill>
+                </a:uFill>
+              </a:rPr>
+              <a:t> Network Basics</a:t>
+            </a:r>
+            <a:endParaRPr lang="de-DE" sz="3200" b="0" spc="-1" dirty="0">
+              <a:solidFill>
+                <a:srgbClr val="000000"/>
+              </a:solidFill>
+              <a:uFill>
+                <a:solidFill>
+                  <a:srgbClr val="FFFFFF"/>
+                </a:solidFill>
+              </a:uFill>
+            </a:endParaRPr>
           </a:p>
         </p:txBody>
       </p:sp>
@@ -27383,7 +27592,7 @@
                 <a:latin typeface="Arial"/>
                 <a:ea typeface="Arial"/>
               </a:rPr>
-              <a:t>What</a:t>
+              <a:t>Which</a:t>
             </a:r>
             <a:r>
               <a:rPr lang="de-DE" sz="2400" b="1" strike="noStrike" spc="-1" dirty="0">

</xml_diff>

<commit_message>
Finalized text gen notebook
</commit_message>
<xml_diff>
--- a/docs/introduction.pptx
+++ b/docs/introduction.pptx
@@ -27492,7 +27492,21 @@
                 </a:uFill>
                 <a:hlinkClick r:id="rId4"/>
               </a:rPr>
-              <a:t>https://www.anaconda.com/download/</a:t>
+              <a:t>https://www.anaconda.com/</a:t>
+            </a:r>
+            <a:r>
+              <a:rPr lang="en-US" sz="2400" spc="-1">
+                <a:solidFill>
+                  <a:srgbClr val="000000"/>
+                </a:solidFill>
+                <a:uFill>
+                  <a:solidFill>
+                    <a:srgbClr val="FFFFFF"/>
+                  </a:solidFill>
+                </a:uFill>
+                <a:hlinkClick r:id="rId4"/>
+              </a:rPr>
+              <a:t>download/</a:t>
             </a:r>
             <a:r>
               <a:rPr lang="en-US" sz="2400" spc="-1" dirty="0">
@@ -27506,6 +27520,57 @@
                 </a:uFill>
               </a:rPr>
               <a:t>)</a:t>
+            </a:r>
+          </a:p>
+          <a:p>
+            <a:pPr marL="343080" indent="-342720">
+              <a:lnSpc>
+                <a:spcPct val="200000"/>
+              </a:lnSpc>
+              <a:buClr>
+                <a:srgbClr val="8064A2"/>
+              </a:buClr>
+              <a:buFont typeface="Arial"/>
+              <a:buChar char="&gt;"/>
+            </a:pPr>
+            <a:r>
+              <a:rPr lang="de-DE" sz="2400" spc="-1">
+                <a:solidFill>
+                  <a:srgbClr val="000000"/>
+                </a:solidFill>
+                <a:uFill>
+                  <a:solidFill>
+                    <a:srgbClr val="FFFFFF"/>
+                  </a:solidFill>
+                </a:uFill>
+              </a:rPr>
+              <a:t>K</a:t>
+            </a:r>
+            <a:r>
+              <a:rPr lang="en-US" sz="2400" spc="-1">
+                <a:solidFill>
+                  <a:srgbClr val="000000"/>
+                </a:solidFill>
+                <a:uFill>
+                  <a:solidFill>
+                    <a:srgbClr val="FFFFFF"/>
+                  </a:solidFill>
+                </a:uFill>
+              </a:rPr>
+              <a:t>eras </a:t>
+            </a:r>
+            <a:r>
+              <a:rPr lang="en-US" sz="2400" spc="-1" dirty="0">
+                <a:solidFill>
+                  <a:srgbClr val="000000"/>
+                </a:solidFill>
+                <a:uFill>
+                  <a:solidFill>
+                    <a:srgbClr val="FFFFFF"/>
+                  </a:solidFill>
+                </a:uFill>
+              </a:rPr>
+              <a:t>(</a:t>
             </a:r>
           </a:p>
           <a:p>

</xml_diff>